<commit_message>
Load The Temple Inn & Suites
</commit_message>
<xml_diff>
--- a/chamber/wireframesketche_directorypage.pptx
+++ b/chamber/wireframesketche_directorypage.pptx
@@ -6,6 +6,8 @@
   </p:sldMasterIdLst>
   <p:sldIdLst>
     <p:sldId id="256" r:id="rId2"/>
+    <p:sldId id="257" r:id="rId3"/>
+    <p:sldId id="258" r:id="rId4"/>
   </p:sldIdLst>
   <p:sldSz cx="12192000" cy="6858000"/>
   <p:notesSz cx="6858000" cy="9144000"/>
@@ -104,6 +106,11 @@
       </a:defRPr>
     </a:lvl9pPr>
   </p:defaultTextStyle>
+  <p:extLst>
+    <p:ext uri="{EFAFB233-063F-42B5-8137-9DF3F51BA10A}">
+      <p15:sldGuideLst xmlns:p15="http://schemas.microsoft.com/office/powerpoint/2012/main"/>
+    </p:ext>
+  </p:extLst>
 </p:presentation>
 </file>
 
@@ -238,7 +245,7 @@
           <a:p>
             <a:fld id="{4FBB2946-B51B-4BF2-8260-1BC40581A89D}" type="datetimeFigureOut">
               <a:rPr lang="en-US" smtClean="0"/>
-              <a:t>6/18/2022</a:t>
+              <a:t>7/9/2022</a:t>
             </a:fld>
             <a:endParaRPr lang="en-US"/>
           </a:p>
@@ -408,7 +415,7 @@
           <a:p>
             <a:fld id="{4FBB2946-B51B-4BF2-8260-1BC40581A89D}" type="datetimeFigureOut">
               <a:rPr lang="en-US" smtClean="0"/>
-              <a:t>6/18/2022</a:t>
+              <a:t>7/9/2022</a:t>
             </a:fld>
             <a:endParaRPr lang="en-US"/>
           </a:p>
@@ -588,7 +595,7 @@
           <a:p>
             <a:fld id="{4FBB2946-B51B-4BF2-8260-1BC40581A89D}" type="datetimeFigureOut">
               <a:rPr lang="en-US" smtClean="0"/>
-              <a:t>6/18/2022</a:t>
+              <a:t>7/9/2022</a:t>
             </a:fld>
             <a:endParaRPr lang="en-US"/>
           </a:p>
@@ -758,7 +765,7 @@
           <a:p>
             <a:fld id="{4FBB2946-B51B-4BF2-8260-1BC40581A89D}" type="datetimeFigureOut">
               <a:rPr lang="en-US" smtClean="0"/>
-              <a:t>6/18/2022</a:t>
+              <a:t>7/9/2022</a:t>
             </a:fld>
             <a:endParaRPr lang="en-US"/>
           </a:p>
@@ -1004,7 +1011,7 @@
           <a:p>
             <a:fld id="{4FBB2946-B51B-4BF2-8260-1BC40581A89D}" type="datetimeFigureOut">
               <a:rPr lang="en-US" smtClean="0"/>
-              <a:t>6/18/2022</a:t>
+              <a:t>7/9/2022</a:t>
             </a:fld>
             <a:endParaRPr lang="en-US"/>
           </a:p>
@@ -1236,7 +1243,7 @@
           <a:p>
             <a:fld id="{4FBB2946-B51B-4BF2-8260-1BC40581A89D}" type="datetimeFigureOut">
               <a:rPr lang="en-US" smtClean="0"/>
-              <a:t>6/18/2022</a:t>
+              <a:t>7/9/2022</a:t>
             </a:fld>
             <a:endParaRPr lang="en-US"/>
           </a:p>
@@ -1603,7 +1610,7 @@
           <a:p>
             <a:fld id="{4FBB2946-B51B-4BF2-8260-1BC40581A89D}" type="datetimeFigureOut">
               <a:rPr lang="en-US" smtClean="0"/>
-              <a:t>6/18/2022</a:t>
+              <a:t>7/9/2022</a:t>
             </a:fld>
             <a:endParaRPr lang="en-US"/>
           </a:p>
@@ -1721,7 +1728,7 @@
           <a:p>
             <a:fld id="{4FBB2946-B51B-4BF2-8260-1BC40581A89D}" type="datetimeFigureOut">
               <a:rPr lang="en-US" smtClean="0"/>
-              <a:t>6/18/2022</a:t>
+              <a:t>7/9/2022</a:t>
             </a:fld>
             <a:endParaRPr lang="en-US"/>
           </a:p>
@@ -1816,7 +1823,7 @@
           <a:p>
             <a:fld id="{4FBB2946-B51B-4BF2-8260-1BC40581A89D}" type="datetimeFigureOut">
               <a:rPr lang="en-US" smtClean="0"/>
-              <a:t>6/18/2022</a:t>
+              <a:t>7/9/2022</a:t>
             </a:fld>
             <a:endParaRPr lang="en-US"/>
           </a:p>
@@ -2093,7 +2100,7 @@
           <a:p>
             <a:fld id="{4FBB2946-B51B-4BF2-8260-1BC40581A89D}" type="datetimeFigureOut">
               <a:rPr lang="en-US" smtClean="0"/>
-              <a:t>6/18/2022</a:t>
+              <a:t>7/9/2022</a:t>
             </a:fld>
             <a:endParaRPr lang="en-US"/>
           </a:p>
@@ -2346,7 +2353,7 @@
           <a:p>
             <a:fld id="{4FBB2946-B51B-4BF2-8260-1BC40581A89D}" type="datetimeFigureOut">
               <a:rPr lang="en-US" smtClean="0"/>
-              <a:t>6/18/2022</a:t>
+              <a:t>7/9/2022</a:t>
             </a:fld>
             <a:endParaRPr lang="en-US"/>
           </a:p>
@@ -2559,7 +2566,7 @@
           <a:p>
             <a:fld id="{4FBB2946-B51B-4BF2-8260-1BC40581A89D}" type="datetimeFigureOut">
               <a:rPr lang="en-US" smtClean="0"/>
-              <a:t>6/18/2022</a:t>
+              <a:t>7/9/2022</a:t>
             </a:fld>
             <a:endParaRPr lang="en-US"/>
           </a:p>
@@ -4364,7 +4371,7 @@
           <a:lstStyle/>
           <a:p>
             <a:pPr algn="ctr"/>
-            <a:endParaRPr lang="en-US"/>
+            <a:endParaRPr lang="en-US" dirty="0"/>
           </a:p>
         </p:txBody>
       </p:sp>
@@ -5725,6 +5732,4230 @@
     <p:extLst>
       <p:ext uri="{BB962C8B-B14F-4D97-AF65-F5344CB8AC3E}">
         <p14:creationId xmlns:p14="http://schemas.microsoft.com/office/powerpoint/2010/main" val="1624861843"/>
+      </p:ext>
+    </p:extLst>
+  </p:cSld>
+  <p:clrMapOvr>
+    <a:masterClrMapping/>
+  </p:clrMapOvr>
+</p:sld>
+</file>
+
+<file path=ppt/slides/slide2.xml><?xml version="1.0" encoding="utf-8"?>
+<p:sld xmlns:a="http://schemas.openxmlformats.org/drawingml/2006/main" xmlns:r="http://schemas.openxmlformats.org/officeDocument/2006/relationships" xmlns:p="http://schemas.openxmlformats.org/presentationml/2006/main">
+  <p:cSld>
+    <p:spTree>
+      <p:nvGrpSpPr>
+        <p:cNvPr id="1" name=""/>
+        <p:cNvGrpSpPr/>
+        <p:nvPr/>
+      </p:nvGrpSpPr>
+      <p:grpSpPr>
+        <a:xfrm>
+          <a:off x="0" y="0"/>
+          <a:ext cx="0" cy="0"/>
+          <a:chOff x="0" y="0"/>
+          <a:chExt cx="0" cy="0"/>
+        </a:xfrm>
+      </p:grpSpPr>
+      <p:sp>
+        <p:nvSpPr>
+          <p:cNvPr id="4" name="Rectangle 3"/>
+          <p:cNvSpPr/>
+          <p:nvPr/>
+        </p:nvSpPr>
+        <p:spPr>
+          <a:xfrm>
+            <a:off x="4329627" y="451692"/>
+            <a:ext cx="1591940" cy="818920"/>
+          </a:xfrm>
+          <a:prstGeom prst="rect">
+            <a:avLst/>
+          </a:prstGeom>
+        </p:spPr>
+        <p:style>
+          <a:lnRef idx="2">
+            <a:schemeClr val="accent1">
+              <a:shade val="50000"/>
+            </a:schemeClr>
+          </a:lnRef>
+          <a:fillRef idx="1">
+            <a:schemeClr val="accent1"/>
+          </a:fillRef>
+          <a:effectRef idx="0">
+            <a:schemeClr val="accent1"/>
+          </a:effectRef>
+          <a:fontRef idx="minor">
+            <a:schemeClr val="lt1"/>
+          </a:fontRef>
+        </p:style>
+        <p:txBody>
+          <a:bodyPr rtlCol="0" anchor="ctr"/>
+          <a:lstStyle/>
+          <a:p>
+            <a:pPr algn="ctr"/>
+            <a:r>
+              <a:rPr lang="en-US" dirty="0" smtClean="0"/>
+              <a:t>Home Page</a:t>
+            </a:r>
+            <a:endParaRPr lang="en-US" dirty="0"/>
+          </a:p>
+        </p:txBody>
+      </p:sp>
+      <p:sp>
+        <p:nvSpPr>
+          <p:cNvPr id="5" name="Rectangle 4"/>
+          <p:cNvSpPr/>
+          <p:nvPr/>
+        </p:nvSpPr>
+        <p:spPr>
+          <a:xfrm>
+            <a:off x="4316772" y="2390670"/>
+            <a:ext cx="1591940" cy="818920"/>
+          </a:xfrm>
+          <a:prstGeom prst="rect">
+            <a:avLst/>
+          </a:prstGeom>
+        </p:spPr>
+        <p:style>
+          <a:lnRef idx="2">
+            <a:schemeClr val="accent1">
+              <a:shade val="50000"/>
+            </a:schemeClr>
+          </a:lnRef>
+          <a:fillRef idx="1">
+            <a:schemeClr val="accent1"/>
+          </a:fillRef>
+          <a:effectRef idx="0">
+            <a:schemeClr val="accent1"/>
+          </a:effectRef>
+          <a:fontRef idx="minor">
+            <a:schemeClr val="lt1"/>
+          </a:fontRef>
+        </p:style>
+        <p:txBody>
+          <a:bodyPr rtlCol="0" anchor="ctr"/>
+          <a:lstStyle/>
+          <a:p>
+            <a:pPr algn="ctr"/>
+            <a:r>
+              <a:rPr lang="en-US" dirty="0" smtClean="0"/>
+              <a:t>Reservations</a:t>
+            </a:r>
+            <a:endParaRPr lang="en-US" dirty="0"/>
+          </a:p>
+        </p:txBody>
+      </p:sp>
+      <p:sp>
+        <p:nvSpPr>
+          <p:cNvPr id="6" name="Rectangle 5"/>
+          <p:cNvSpPr/>
+          <p:nvPr/>
+        </p:nvSpPr>
+        <p:spPr>
+          <a:xfrm>
+            <a:off x="8297993" y="2398001"/>
+            <a:ext cx="1591940" cy="818920"/>
+          </a:xfrm>
+          <a:prstGeom prst="rect">
+            <a:avLst/>
+          </a:prstGeom>
+        </p:spPr>
+        <p:style>
+          <a:lnRef idx="2">
+            <a:schemeClr val="accent1">
+              <a:shade val="50000"/>
+            </a:schemeClr>
+          </a:lnRef>
+          <a:fillRef idx="1">
+            <a:schemeClr val="accent1"/>
+          </a:fillRef>
+          <a:effectRef idx="0">
+            <a:schemeClr val="accent1"/>
+          </a:effectRef>
+          <a:fontRef idx="minor">
+            <a:schemeClr val="lt1"/>
+          </a:fontRef>
+        </p:style>
+        <p:txBody>
+          <a:bodyPr rtlCol="0" anchor="ctr"/>
+          <a:lstStyle/>
+          <a:p>
+            <a:pPr algn="ctr"/>
+            <a:r>
+              <a:rPr lang="en-US" dirty="0" smtClean="0"/>
+              <a:t>Services</a:t>
+            </a:r>
+            <a:endParaRPr lang="en-US" dirty="0"/>
+          </a:p>
+        </p:txBody>
+      </p:sp>
+      <p:sp>
+        <p:nvSpPr>
+          <p:cNvPr id="8" name="Rectangle 7"/>
+          <p:cNvSpPr/>
+          <p:nvPr/>
+        </p:nvSpPr>
+        <p:spPr>
+          <a:xfrm>
+            <a:off x="1610295" y="2398001"/>
+            <a:ext cx="1591940" cy="818920"/>
+          </a:xfrm>
+          <a:prstGeom prst="rect">
+            <a:avLst/>
+          </a:prstGeom>
+        </p:spPr>
+        <p:style>
+          <a:lnRef idx="2">
+            <a:schemeClr val="accent1">
+              <a:shade val="50000"/>
+            </a:schemeClr>
+          </a:lnRef>
+          <a:fillRef idx="1">
+            <a:schemeClr val="accent1"/>
+          </a:fillRef>
+          <a:effectRef idx="0">
+            <a:schemeClr val="accent1"/>
+          </a:effectRef>
+          <a:fontRef idx="minor">
+            <a:schemeClr val="lt1"/>
+          </a:fontRef>
+        </p:style>
+        <p:txBody>
+          <a:bodyPr rtlCol="0" anchor="ctr"/>
+          <a:lstStyle/>
+          <a:p>
+            <a:pPr algn="ctr"/>
+            <a:r>
+              <a:rPr lang="en-US" dirty="0" smtClean="0"/>
+              <a:t>Temple Page</a:t>
+            </a:r>
+            <a:endParaRPr lang="en-US" dirty="0"/>
+          </a:p>
+        </p:txBody>
+      </p:sp>
+      <p:sp>
+        <p:nvSpPr>
+          <p:cNvPr id="10" name="Oval 9"/>
+          <p:cNvSpPr/>
+          <p:nvPr/>
+        </p:nvSpPr>
+        <p:spPr>
+          <a:xfrm>
+            <a:off x="614646" y="137711"/>
+            <a:ext cx="1388126" cy="627961"/>
+          </a:xfrm>
+          <a:prstGeom prst="ellipse">
+            <a:avLst/>
+          </a:prstGeom>
+          <a:solidFill>
+            <a:schemeClr val="accent6">
+              <a:lumMod val="40000"/>
+              <a:lumOff val="60000"/>
+            </a:schemeClr>
+          </a:solidFill>
+          <a:ln>
+            <a:solidFill>
+              <a:schemeClr val="accent6">
+                <a:lumMod val="40000"/>
+                <a:lumOff val="60000"/>
+              </a:schemeClr>
+            </a:solidFill>
+          </a:ln>
+        </p:spPr>
+        <p:style>
+          <a:lnRef idx="2">
+            <a:schemeClr val="accent1">
+              <a:shade val="50000"/>
+            </a:schemeClr>
+          </a:lnRef>
+          <a:fillRef idx="1">
+            <a:schemeClr val="accent1"/>
+          </a:fillRef>
+          <a:effectRef idx="0">
+            <a:schemeClr val="accent1"/>
+          </a:effectRef>
+          <a:fontRef idx="minor">
+            <a:schemeClr val="lt1"/>
+          </a:fontRef>
+        </p:style>
+        <p:txBody>
+          <a:bodyPr rtlCol="0" anchor="ctr"/>
+          <a:lstStyle/>
+          <a:p>
+            <a:pPr algn="ctr"/>
+            <a:r>
+              <a:rPr lang="en-US" dirty="0" smtClean="0">
+                <a:solidFill>
+                  <a:schemeClr val="tx1"/>
+                </a:solidFill>
+              </a:rPr>
+              <a:t>Call to Action</a:t>
+            </a:r>
+            <a:endParaRPr lang="en-US" dirty="0">
+              <a:solidFill>
+                <a:schemeClr val="tx1"/>
+              </a:solidFill>
+            </a:endParaRPr>
+          </a:p>
+        </p:txBody>
+      </p:sp>
+      <p:sp>
+        <p:nvSpPr>
+          <p:cNvPr id="11" name="Oval 10"/>
+          <p:cNvSpPr/>
+          <p:nvPr/>
+        </p:nvSpPr>
+        <p:spPr>
+          <a:xfrm>
+            <a:off x="614646" y="839118"/>
+            <a:ext cx="1388126" cy="627961"/>
+          </a:xfrm>
+          <a:prstGeom prst="ellipse">
+            <a:avLst/>
+          </a:prstGeom>
+          <a:solidFill>
+            <a:schemeClr val="accent6">
+              <a:lumMod val="40000"/>
+              <a:lumOff val="60000"/>
+            </a:schemeClr>
+          </a:solidFill>
+          <a:ln>
+            <a:solidFill>
+              <a:schemeClr val="accent6">
+                <a:lumMod val="40000"/>
+                <a:lumOff val="60000"/>
+              </a:schemeClr>
+            </a:solidFill>
+          </a:ln>
+        </p:spPr>
+        <p:style>
+          <a:lnRef idx="2">
+            <a:schemeClr val="accent1">
+              <a:shade val="50000"/>
+            </a:schemeClr>
+          </a:lnRef>
+          <a:fillRef idx="1">
+            <a:schemeClr val="accent1"/>
+          </a:fillRef>
+          <a:effectRef idx="0">
+            <a:schemeClr val="accent1"/>
+          </a:effectRef>
+          <a:fontRef idx="minor">
+            <a:schemeClr val="lt1"/>
+          </a:fontRef>
+        </p:style>
+        <p:txBody>
+          <a:bodyPr rtlCol="0" anchor="ctr"/>
+          <a:lstStyle/>
+          <a:p>
+            <a:pPr algn="ctr"/>
+            <a:r>
+              <a:rPr lang="en-US" dirty="0" smtClean="0">
+                <a:solidFill>
+                  <a:schemeClr val="tx1"/>
+                </a:solidFill>
+              </a:rPr>
+              <a:t>Contact info</a:t>
+            </a:r>
+            <a:endParaRPr lang="en-US" dirty="0">
+              <a:solidFill>
+                <a:schemeClr val="tx1"/>
+              </a:solidFill>
+            </a:endParaRPr>
+          </a:p>
+        </p:txBody>
+      </p:sp>
+      <p:sp>
+        <p:nvSpPr>
+          <p:cNvPr id="12" name="Oval 11"/>
+          <p:cNvSpPr/>
+          <p:nvPr/>
+        </p:nvSpPr>
+        <p:spPr>
+          <a:xfrm>
+            <a:off x="625663" y="1540525"/>
+            <a:ext cx="1388126" cy="627961"/>
+          </a:xfrm>
+          <a:prstGeom prst="ellipse">
+            <a:avLst/>
+          </a:prstGeom>
+          <a:solidFill>
+            <a:schemeClr val="accent6">
+              <a:lumMod val="40000"/>
+              <a:lumOff val="60000"/>
+            </a:schemeClr>
+          </a:solidFill>
+          <a:ln>
+            <a:solidFill>
+              <a:schemeClr val="accent6">
+                <a:lumMod val="40000"/>
+                <a:lumOff val="60000"/>
+              </a:schemeClr>
+            </a:solidFill>
+          </a:ln>
+        </p:spPr>
+        <p:style>
+          <a:lnRef idx="2">
+            <a:schemeClr val="accent1">
+              <a:shade val="50000"/>
+            </a:schemeClr>
+          </a:lnRef>
+          <a:fillRef idx="1">
+            <a:schemeClr val="accent1"/>
+          </a:fillRef>
+          <a:effectRef idx="0">
+            <a:schemeClr val="accent1"/>
+          </a:effectRef>
+          <a:fontRef idx="minor">
+            <a:schemeClr val="lt1"/>
+          </a:fontRef>
+        </p:style>
+        <p:txBody>
+          <a:bodyPr rtlCol="0" anchor="ctr"/>
+          <a:lstStyle/>
+          <a:p>
+            <a:pPr algn="ctr"/>
+            <a:r>
+              <a:rPr lang="en-US" dirty="0" smtClean="0">
+                <a:solidFill>
+                  <a:schemeClr val="tx1"/>
+                </a:solidFill>
+              </a:rPr>
+              <a:t>Temp</a:t>
+            </a:r>
+            <a:endParaRPr lang="en-US" dirty="0">
+              <a:solidFill>
+                <a:schemeClr val="tx1"/>
+              </a:solidFill>
+            </a:endParaRPr>
+          </a:p>
+        </p:txBody>
+      </p:sp>
+      <p:sp>
+        <p:nvSpPr>
+          <p:cNvPr id="15" name="Oval 14"/>
+          <p:cNvSpPr/>
+          <p:nvPr/>
+        </p:nvSpPr>
+        <p:spPr>
+          <a:xfrm>
+            <a:off x="10289315" y="1607544"/>
+            <a:ext cx="1388126" cy="627961"/>
+          </a:xfrm>
+          <a:prstGeom prst="ellipse">
+            <a:avLst/>
+          </a:prstGeom>
+          <a:solidFill>
+            <a:schemeClr val="accent6">
+              <a:lumMod val="40000"/>
+              <a:lumOff val="60000"/>
+            </a:schemeClr>
+          </a:solidFill>
+          <a:ln>
+            <a:solidFill>
+              <a:schemeClr val="accent6">
+                <a:lumMod val="40000"/>
+                <a:lumOff val="60000"/>
+              </a:schemeClr>
+            </a:solidFill>
+          </a:ln>
+        </p:spPr>
+        <p:style>
+          <a:lnRef idx="2">
+            <a:schemeClr val="accent1">
+              <a:shade val="50000"/>
+            </a:schemeClr>
+          </a:lnRef>
+          <a:fillRef idx="1">
+            <a:schemeClr val="accent1"/>
+          </a:fillRef>
+          <a:effectRef idx="0">
+            <a:schemeClr val="accent1"/>
+          </a:effectRef>
+          <a:fontRef idx="minor">
+            <a:schemeClr val="lt1"/>
+          </a:fontRef>
+        </p:style>
+        <p:txBody>
+          <a:bodyPr rtlCol="0" anchor="ctr"/>
+          <a:lstStyle/>
+          <a:p>
+            <a:pPr algn="ctr"/>
+            <a:r>
+              <a:rPr lang="en-US" sz="1400" dirty="0" smtClean="0">
+                <a:solidFill>
+                  <a:schemeClr val="tx1"/>
+                </a:solidFill>
+              </a:rPr>
+              <a:t>Amenities</a:t>
+            </a:r>
+            <a:endParaRPr lang="en-US" sz="1400" dirty="0">
+              <a:solidFill>
+                <a:schemeClr val="tx1"/>
+              </a:solidFill>
+            </a:endParaRPr>
+          </a:p>
+        </p:txBody>
+      </p:sp>
+      <p:sp>
+        <p:nvSpPr>
+          <p:cNvPr id="16" name="Oval 15"/>
+          <p:cNvSpPr/>
+          <p:nvPr/>
+        </p:nvSpPr>
+        <p:spPr>
+          <a:xfrm>
+            <a:off x="10355852" y="2235505"/>
+            <a:ext cx="1388126" cy="627961"/>
+          </a:xfrm>
+          <a:prstGeom prst="ellipse">
+            <a:avLst/>
+          </a:prstGeom>
+          <a:solidFill>
+            <a:schemeClr val="accent6">
+              <a:lumMod val="40000"/>
+              <a:lumOff val="60000"/>
+            </a:schemeClr>
+          </a:solidFill>
+          <a:ln>
+            <a:solidFill>
+              <a:schemeClr val="accent6">
+                <a:lumMod val="40000"/>
+                <a:lumOff val="60000"/>
+              </a:schemeClr>
+            </a:solidFill>
+          </a:ln>
+        </p:spPr>
+        <p:style>
+          <a:lnRef idx="2">
+            <a:schemeClr val="accent1">
+              <a:shade val="50000"/>
+            </a:schemeClr>
+          </a:lnRef>
+          <a:fillRef idx="1">
+            <a:schemeClr val="accent1"/>
+          </a:fillRef>
+          <a:effectRef idx="0">
+            <a:schemeClr val="accent1"/>
+          </a:effectRef>
+          <a:fontRef idx="minor">
+            <a:schemeClr val="lt1"/>
+          </a:fontRef>
+        </p:style>
+        <p:txBody>
+          <a:bodyPr rtlCol="0" anchor="ctr"/>
+          <a:lstStyle/>
+          <a:p>
+            <a:pPr algn="ctr"/>
+            <a:r>
+              <a:rPr lang="en-US" dirty="0" smtClean="0">
+                <a:solidFill>
+                  <a:schemeClr val="tx1"/>
+                </a:solidFill>
+              </a:rPr>
+              <a:t>Special Services</a:t>
+            </a:r>
+            <a:endParaRPr lang="en-US" dirty="0">
+              <a:solidFill>
+                <a:schemeClr val="tx1"/>
+              </a:solidFill>
+            </a:endParaRPr>
+          </a:p>
+        </p:txBody>
+      </p:sp>
+      <p:sp>
+        <p:nvSpPr>
+          <p:cNvPr id="17" name="Oval 16"/>
+          <p:cNvSpPr/>
+          <p:nvPr/>
+        </p:nvSpPr>
+        <p:spPr>
+          <a:xfrm>
+            <a:off x="10366869" y="2847860"/>
+            <a:ext cx="1388126" cy="627961"/>
+          </a:xfrm>
+          <a:prstGeom prst="ellipse">
+            <a:avLst/>
+          </a:prstGeom>
+          <a:solidFill>
+            <a:schemeClr val="accent6">
+              <a:lumMod val="40000"/>
+              <a:lumOff val="60000"/>
+            </a:schemeClr>
+          </a:solidFill>
+          <a:ln>
+            <a:solidFill>
+              <a:schemeClr val="accent6">
+                <a:lumMod val="40000"/>
+                <a:lumOff val="60000"/>
+              </a:schemeClr>
+            </a:solidFill>
+          </a:ln>
+        </p:spPr>
+        <p:style>
+          <a:lnRef idx="2">
+            <a:schemeClr val="accent1">
+              <a:shade val="50000"/>
+            </a:schemeClr>
+          </a:lnRef>
+          <a:fillRef idx="1">
+            <a:schemeClr val="accent1"/>
+          </a:fillRef>
+          <a:effectRef idx="0">
+            <a:schemeClr val="accent1"/>
+          </a:effectRef>
+          <a:fontRef idx="minor">
+            <a:schemeClr val="lt1"/>
+          </a:fontRef>
+        </p:style>
+        <p:txBody>
+          <a:bodyPr rtlCol="0" anchor="ctr"/>
+          <a:lstStyle/>
+          <a:p>
+            <a:pPr algn="ctr"/>
+            <a:r>
+              <a:rPr lang="en-US" dirty="0" smtClean="0">
+                <a:solidFill>
+                  <a:schemeClr val="tx1"/>
+                </a:solidFill>
+              </a:rPr>
+              <a:t>Sub Pages</a:t>
+            </a:r>
+            <a:endParaRPr lang="en-US" dirty="0">
+              <a:solidFill>
+                <a:schemeClr val="tx1"/>
+              </a:solidFill>
+            </a:endParaRPr>
+          </a:p>
+        </p:txBody>
+      </p:sp>
+      <p:sp>
+        <p:nvSpPr>
+          <p:cNvPr id="18" name="Oval 17"/>
+          <p:cNvSpPr/>
+          <p:nvPr/>
+        </p:nvSpPr>
+        <p:spPr>
+          <a:xfrm>
+            <a:off x="5198575" y="3782449"/>
+            <a:ext cx="1388126" cy="627961"/>
+          </a:xfrm>
+          <a:prstGeom prst="ellipse">
+            <a:avLst/>
+          </a:prstGeom>
+          <a:solidFill>
+            <a:schemeClr val="accent6">
+              <a:lumMod val="40000"/>
+              <a:lumOff val="60000"/>
+            </a:schemeClr>
+          </a:solidFill>
+          <a:ln>
+            <a:solidFill>
+              <a:schemeClr val="accent6">
+                <a:lumMod val="40000"/>
+                <a:lumOff val="60000"/>
+              </a:schemeClr>
+            </a:solidFill>
+          </a:ln>
+        </p:spPr>
+        <p:style>
+          <a:lnRef idx="2">
+            <a:schemeClr val="accent1">
+              <a:shade val="50000"/>
+            </a:schemeClr>
+          </a:lnRef>
+          <a:fillRef idx="1">
+            <a:schemeClr val="accent1"/>
+          </a:fillRef>
+          <a:effectRef idx="0">
+            <a:schemeClr val="accent1"/>
+          </a:effectRef>
+          <a:fontRef idx="minor">
+            <a:schemeClr val="lt1"/>
+          </a:fontRef>
+        </p:style>
+        <p:txBody>
+          <a:bodyPr rtlCol="0" anchor="ctr"/>
+          <a:lstStyle/>
+          <a:p>
+            <a:pPr algn="ctr"/>
+            <a:r>
+              <a:rPr lang="en-US" dirty="0" smtClean="0">
+                <a:solidFill>
+                  <a:schemeClr val="tx1"/>
+                </a:solidFill>
+              </a:rPr>
+              <a:t>Special info</a:t>
+            </a:r>
+            <a:endParaRPr lang="en-US" dirty="0">
+              <a:solidFill>
+                <a:schemeClr val="tx1"/>
+              </a:solidFill>
+            </a:endParaRPr>
+          </a:p>
+        </p:txBody>
+      </p:sp>
+      <p:sp>
+        <p:nvSpPr>
+          <p:cNvPr id="19" name="Oval 18"/>
+          <p:cNvSpPr/>
+          <p:nvPr/>
+        </p:nvSpPr>
+        <p:spPr>
+          <a:xfrm>
+            <a:off x="3426929" y="3819162"/>
+            <a:ext cx="1388126" cy="627961"/>
+          </a:xfrm>
+          <a:prstGeom prst="ellipse">
+            <a:avLst/>
+          </a:prstGeom>
+          <a:solidFill>
+            <a:schemeClr val="accent6">
+              <a:lumMod val="40000"/>
+              <a:lumOff val="60000"/>
+            </a:schemeClr>
+          </a:solidFill>
+          <a:ln>
+            <a:solidFill>
+              <a:schemeClr val="accent6">
+                <a:lumMod val="40000"/>
+                <a:lumOff val="60000"/>
+              </a:schemeClr>
+            </a:solidFill>
+          </a:ln>
+        </p:spPr>
+        <p:style>
+          <a:lnRef idx="2">
+            <a:schemeClr val="accent1">
+              <a:shade val="50000"/>
+            </a:schemeClr>
+          </a:lnRef>
+          <a:fillRef idx="1">
+            <a:schemeClr val="accent1"/>
+          </a:fillRef>
+          <a:effectRef idx="0">
+            <a:schemeClr val="accent1"/>
+          </a:effectRef>
+          <a:fontRef idx="minor">
+            <a:schemeClr val="lt1"/>
+          </a:fontRef>
+        </p:style>
+        <p:txBody>
+          <a:bodyPr rtlCol="0" anchor="ctr"/>
+          <a:lstStyle/>
+          <a:p>
+            <a:pPr algn="ctr"/>
+            <a:r>
+              <a:rPr lang="en-US" dirty="0" smtClean="0">
+                <a:solidFill>
+                  <a:schemeClr val="tx1"/>
+                </a:solidFill>
+              </a:rPr>
+              <a:t>Contact info</a:t>
+            </a:r>
+            <a:endParaRPr lang="en-US" dirty="0">
+              <a:solidFill>
+                <a:schemeClr val="tx1"/>
+              </a:solidFill>
+            </a:endParaRPr>
+          </a:p>
+        </p:txBody>
+      </p:sp>
+      <p:sp>
+        <p:nvSpPr>
+          <p:cNvPr id="20" name="Oval 19"/>
+          <p:cNvSpPr/>
+          <p:nvPr/>
+        </p:nvSpPr>
+        <p:spPr>
+          <a:xfrm>
+            <a:off x="4431534" y="4221286"/>
+            <a:ext cx="1388126" cy="627961"/>
+          </a:xfrm>
+          <a:prstGeom prst="ellipse">
+            <a:avLst/>
+          </a:prstGeom>
+          <a:solidFill>
+            <a:schemeClr val="accent6">
+              <a:lumMod val="40000"/>
+              <a:lumOff val="60000"/>
+            </a:schemeClr>
+          </a:solidFill>
+          <a:ln>
+            <a:solidFill>
+              <a:schemeClr val="accent6">
+                <a:lumMod val="40000"/>
+                <a:lumOff val="60000"/>
+              </a:schemeClr>
+            </a:solidFill>
+          </a:ln>
+        </p:spPr>
+        <p:style>
+          <a:lnRef idx="2">
+            <a:schemeClr val="accent1">
+              <a:shade val="50000"/>
+            </a:schemeClr>
+          </a:lnRef>
+          <a:fillRef idx="1">
+            <a:schemeClr val="accent1"/>
+          </a:fillRef>
+          <a:effectRef idx="0">
+            <a:schemeClr val="accent1"/>
+          </a:effectRef>
+          <a:fontRef idx="minor">
+            <a:schemeClr val="lt1"/>
+          </a:fontRef>
+        </p:style>
+        <p:txBody>
+          <a:bodyPr rtlCol="0" anchor="ctr"/>
+          <a:lstStyle/>
+          <a:p>
+            <a:pPr algn="ctr"/>
+            <a:r>
+              <a:rPr lang="en-US" dirty="0" smtClean="0">
+                <a:solidFill>
+                  <a:schemeClr val="tx1"/>
+                </a:solidFill>
+              </a:rPr>
+              <a:t>Validate</a:t>
+            </a:r>
+            <a:endParaRPr lang="en-US" dirty="0">
+              <a:solidFill>
+                <a:schemeClr val="tx1"/>
+              </a:solidFill>
+            </a:endParaRPr>
+          </a:p>
+        </p:txBody>
+      </p:sp>
+      <p:sp>
+        <p:nvSpPr>
+          <p:cNvPr id="21" name="Oval 20"/>
+          <p:cNvSpPr/>
+          <p:nvPr/>
+        </p:nvSpPr>
+        <p:spPr>
+          <a:xfrm>
+            <a:off x="1699938" y="4480185"/>
+            <a:ext cx="1388126" cy="627961"/>
+          </a:xfrm>
+          <a:prstGeom prst="ellipse">
+            <a:avLst/>
+          </a:prstGeom>
+          <a:solidFill>
+            <a:schemeClr val="accent6">
+              <a:lumMod val="40000"/>
+              <a:lumOff val="60000"/>
+            </a:schemeClr>
+          </a:solidFill>
+          <a:ln>
+            <a:solidFill>
+              <a:schemeClr val="accent6">
+                <a:lumMod val="40000"/>
+                <a:lumOff val="60000"/>
+              </a:schemeClr>
+            </a:solidFill>
+          </a:ln>
+        </p:spPr>
+        <p:style>
+          <a:lnRef idx="2">
+            <a:schemeClr val="accent1">
+              <a:shade val="50000"/>
+            </a:schemeClr>
+          </a:lnRef>
+          <a:fillRef idx="1">
+            <a:schemeClr val="accent1"/>
+          </a:fillRef>
+          <a:effectRef idx="0">
+            <a:schemeClr val="accent1"/>
+          </a:effectRef>
+          <a:fontRef idx="minor">
+            <a:schemeClr val="lt1"/>
+          </a:fontRef>
+        </p:style>
+        <p:txBody>
+          <a:bodyPr rtlCol="0" anchor="ctr"/>
+          <a:lstStyle/>
+          <a:p>
+            <a:pPr algn="ctr"/>
+            <a:r>
+              <a:rPr lang="en-US" dirty="0" smtClean="0">
+                <a:solidFill>
+                  <a:schemeClr val="tx1"/>
+                </a:solidFill>
+              </a:rPr>
+              <a:t>Select Temples</a:t>
+            </a:r>
+            <a:endParaRPr lang="en-US" dirty="0">
+              <a:solidFill>
+                <a:schemeClr val="tx1"/>
+              </a:solidFill>
+            </a:endParaRPr>
+          </a:p>
+        </p:txBody>
+      </p:sp>
+      <p:sp>
+        <p:nvSpPr>
+          <p:cNvPr id="22" name="Oval 21"/>
+          <p:cNvSpPr/>
+          <p:nvPr/>
+        </p:nvSpPr>
+        <p:spPr>
+          <a:xfrm>
+            <a:off x="676522" y="4825379"/>
+            <a:ext cx="1388126" cy="627961"/>
+          </a:xfrm>
+          <a:prstGeom prst="ellipse">
+            <a:avLst/>
+          </a:prstGeom>
+          <a:solidFill>
+            <a:schemeClr val="accent6">
+              <a:lumMod val="40000"/>
+              <a:lumOff val="60000"/>
+            </a:schemeClr>
+          </a:solidFill>
+          <a:ln>
+            <a:solidFill>
+              <a:schemeClr val="accent6">
+                <a:lumMod val="40000"/>
+                <a:lumOff val="60000"/>
+              </a:schemeClr>
+            </a:solidFill>
+          </a:ln>
+        </p:spPr>
+        <p:style>
+          <a:lnRef idx="2">
+            <a:schemeClr val="accent1">
+              <a:shade val="50000"/>
+            </a:schemeClr>
+          </a:lnRef>
+          <a:fillRef idx="1">
+            <a:schemeClr val="accent1"/>
+          </a:fillRef>
+          <a:effectRef idx="0">
+            <a:schemeClr val="accent1"/>
+          </a:effectRef>
+          <a:fontRef idx="minor">
+            <a:schemeClr val="lt1"/>
+          </a:fontRef>
+        </p:style>
+        <p:txBody>
+          <a:bodyPr rtlCol="0" anchor="ctr"/>
+          <a:lstStyle/>
+          <a:p>
+            <a:pPr algn="ctr"/>
+            <a:r>
+              <a:rPr lang="en-US" dirty="0" smtClean="0">
+                <a:solidFill>
+                  <a:schemeClr val="tx1"/>
+                </a:solidFill>
+              </a:rPr>
+              <a:t>Temple Details</a:t>
+            </a:r>
+            <a:endParaRPr lang="en-US" dirty="0">
+              <a:solidFill>
+                <a:schemeClr val="tx1"/>
+              </a:solidFill>
+            </a:endParaRPr>
+          </a:p>
+        </p:txBody>
+      </p:sp>
+      <p:sp>
+        <p:nvSpPr>
+          <p:cNvPr id="23" name="Oval 22"/>
+          <p:cNvSpPr/>
+          <p:nvPr/>
+        </p:nvSpPr>
+        <p:spPr>
+          <a:xfrm>
+            <a:off x="2669400" y="4900658"/>
+            <a:ext cx="1388126" cy="627961"/>
+          </a:xfrm>
+          <a:prstGeom prst="ellipse">
+            <a:avLst/>
+          </a:prstGeom>
+          <a:solidFill>
+            <a:schemeClr val="accent6">
+              <a:lumMod val="40000"/>
+              <a:lumOff val="60000"/>
+            </a:schemeClr>
+          </a:solidFill>
+          <a:ln>
+            <a:solidFill>
+              <a:schemeClr val="accent6">
+                <a:lumMod val="40000"/>
+                <a:lumOff val="60000"/>
+              </a:schemeClr>
+            </a:solidFill>
+          </a:ln>
+        </p:spPr>
+        <p:style>
+          <a:lnRef idx="2">
+            <a:schemeClr val="accent1">
+              <a:shade val="50000"/>
+            </a:schemeClr>
+          </a:lnRef>
+          <a:fillRef idx="1">
+            <a:schemeClr val="accent1"/>
+          </a:fillRef>
+          <a:effectRef idx="0">
+            <a:schemeClr val="accent1"/>
+          </a:effectRef>
+          <a:fontRef idx="minor">
+            <a:schemeClr val="lt1"/>
+          </a:fontRef>
+        </p:style>
+        <p:txBody>
+          <a:bodyPr rtlCol="0" anchor="ctr"/>
+          <a:lstStyle/>
+          <a:p>
+            <a:pPr algn="ctr"/>
+            <a:r>
+              <a:rPr lang="en-US" dirty="0" smtClean="0">
+                <a:solidFill>
+                  <a:schemeClr val="tx1"/>
+                </a:solidFill>
+              </a:rPr>
+              <a:t>Like Temple</a:t>
+            </a:r>
+            <a:endParaRPr lang="en-US" dirty="0">
+              <a:solidFill>
+                <a:schemeClr val="tx1"/>
+              </a:solidFill>
+            </a:endParaRPr>
+          </a:p>
+        </p:txBody>
+      </p:sp>
+      <p:cxnSp>
+        <p:nvCxnSpPr>
+          <p:cNvPr id="25" name="Straight Connector 24"/>
+          <p:cNvCxnSpPr>
+            <a:stCxn id="4" idx="3"/>
+            <a:endCxn id="10" idx="6"/>
+          </p:cNvCxnSpPr>
+          <p:nvPr/>
+        </p:nvCxnSpPr>
+        <p:spPr>
+          <a:xfrm flipH="1" flipV="1">
+            <a:off x="2002772" y="451692"/>
+            <a:ext cx="3918795" cy="409460"/>
+          </a:xfrm>
+          <a:prstGeom prst="line">
+            <a:avLst/>
+          </a:prstGeom>
+        </p:spPr>
+        <p:style>
+          <a:lnRef idx="1">
+            <a:schemeClr val="accent1"/>
+          </a:lnRef>
+          <a:fillRef idx="0">
+            <a:schemeClr val="accent1"/>
+          </a:fillRef>
+          <a:effectRef idx="0">
+            <a:schemeClr val="accent1"/>
+          </a:effectRef>
+          <a:fontRef idx="minor">
+            <a:schemeClr val="tx1"/>
+          </a:fontRef>
+        </p:style>
+      </p:cxnSp>
+      <p:cxnSp>
+        <p:nvCxnSpPr>
+          <p:cNvPr id="27" name="Straight Connector 26"/>
+          <p:cNvCxnSpPr>
+            <a:stCxn id="4" idx="3"/>
+            <a:endCxn id="11" idx="6"/>
+          </p:cNvCxnSpPr>
+          <p:nvPr/>
+        </p:nvCxnSpPr>
+        <p:spPr>
+          <a:xfrm flipH="1">
+            <a:off x="2002772" y="861152"/>
+            <a:ext cx="3918795" cy="291947"/>
+          </a:xfrm>
+          <a:prstGeom prst="line">
+            <a:avLst/>
+          </a:prstGeom>
+        </p:spPr>
+        <p:style>
+          <a:lnRef idx="1">
+            <a:schemeClr val="accent1"/>
+          </a:lnRef>
+          <a:fillRef idx="0">
+            <a:schemeClr val="accent1"/>
+          </a:fillRef>
+          <a:effectRef idx="0">
+            <a:schemeClr val="accent1"/>
+          </a:effectRef>
+          <a:fontRef idx="minor">
+            <a:schemeClr val="tx1"/>
+          </a:fontRef>
+        </p:style>
+      </p:cxnSp>
+      <p:cxnSp>
+        <p:nvCxnSpPr>
+          <p:cNvPr id="29" name="Straight Connector 28"/>
+          <p:cNvCxnSpPr>
+            <a:stCxn id="4" idx="3"/>
+            <a:endCxn id="12" idx="6"/>
+          </p:cNvCxnSpPr>
+          <p:nvPr/>
+        </p:nvCxnSpPr>
+        <p:spPr>
+          <a:xfrm flipH="1">
+            <a:off x="2013789" y="861152"/>
+            <a:ext cx="3907778" cy="993354"/>
+          </a:xfrm>
+          <a:prstGeom prst="line">
+            <a:avLst/>
+          </a:prstGeom>
+        </p:spPr>
+        <p:style>
+          <a:lnRef idx="1">
+            <a:schemeClr val="accent1"/>
+          </a:lnRef>
+          <a:fillRef idx="0">
+            <a:schemeClr val="accent1"/>
+          </a:fillRef>
+          <a:effectRef idx="0">
+            <a:schemeClr val="accent1"/>
+          </a:effectRef>
+          <a:fontRef idx="minor">
+            <a:schemeClr val="tx1"/>
+          </a:fontRef>
+        </p:style>
+      </p:cxnSp>
+      <p:cxnSp>
+        <p:nvCxnSpPr>
+          <p:cNvPr id="33" name="Elbow Connector 32"/>
+          <p:cNvCxnSpPr>
+            <a:stCxn id="4" idx="2"/>
+            <a:endCxn id="8" idx="0"/>
+          </p:cNvCxnSpPr>
+          <p:nvPr/>
+        </p:nvCxnSpPr>
+        <p:spPr>
+          <a:xfrm rot="5400000">
+            <a:off x="3202237" y="474640"/>
+            <a:ext cx="1127389" cy="2719332"/>
+          </a:xfrm>
+          <a:prstGeom prst="bentConnector3">
+            <a:avLst/>
+          </a:prstGeom>
+          <a:ln>
+            <a:solidFill>
+              <a:schemeClr val="accent2"/>
+            </a:solidFill>
+            <a:tailEnd type="triangle"/>
+          </a:ln>
+        </p:spPr>
+        <p:style>
+          <a:lnRef idx="1">
+            <a:schemeClr val="accent1"/>
+          </a:lnRef>
+          <a:fillRef idx="0">
+            <a:schemeClr val="accent1"/>
+          </a:fillRef>
+          <a:effectRef idx="0">
+            <a:schemeClr val="accent1"/>
+          </a:effectRef>
+          <a:fontRef idx="minor">
+            <a:schemeClr val="tx1"/>
+          </a:fontRef>
+        </p:style>
+      </p:cxnSp>
+      <p:cxnSp>
+        <p:nvCxnSpPr>
+          <p:cNvPr id="35" name="Elbow Connector 34"/>
+          <p:cNvCxnSpPr>
+            <a:stCxn id="4" idx="2"/>
+            <a:endCxn id="6" idx="0"/>
+          </p:cNvCxnSpPr>
+          <p:nvPr/>
+        </p:nvCxnSpPr>
+        <p:spPr>
+          <a:xfrm rot="16200000" flipH="1">
+            <a:off x="6546086" y="-149877"/>
+            <a:ext cx="1127389" cy="3968366"/>
+          </a:xfrm>
+          <a:prstGeom prst="bentConnector3">
+            <a:avLst/>
+          </a:prstGeom>
+          <a:ln>
+            <a:solidFill>
+              <a:schemeClr val="accent2"/>
+            </a:solidFill>
+            <a:tailEnd type="triangle"/>
+          </a:ln>
+        </p:spPr>
+        <p:style>
+          <a:lnRef idx="1">
+            <a:schemeClr val="accent1"/>
+          </a:lnRef>
+          <a:fillRef idx="0">
+            <a:schemeClr val="accent1"/>
+          </a:fillRef>
+          <a:effectRef idx="0">
+            <a:schemeClr val="accent1"/>
+          </a:effectRef>
+          <a:fontRef idx="minor">
+            <a:schemeClr val="tx1"/>
+          </a:fontRef>
+        </p:style>
+      </p:cxnSp>
+      <p:cxnSp>
+        <p:nvCxnSpPr>
+          <p:cNvPr id="37" name="Straight Arrow Connector 36"/>
+          <p:cNvCxnSpPr>
+            <a:stCxn id="4" idx="2"/>
+            <a:endCxn id="5" idx="0"/>
+          </p:cNvCxnSpPr>
+          <p:nvPr/>
+        </p:nvCxnSpPr>
+        <p:spPr>
+          <a:xfrm flipH="1">
+            <a:off x="5112742" y="1270612"/>
+            <a:ext cx="12855" cy="1120058"/>
+          </a:xfrm>
+          <a:prstGeom prst="straightConnector1">
+            <a:avLst/>
+          </a:prstGeom>
+          <a:ln>
+            <a:solidFill>
+              <a:schemeClr val="accent2"/>
+            </a:solidFill>
+            <a:tailEnd type="triangle"/>
+          </a:ln>
+        </p:spPr>
+        <p:style>
+          <a:lnRef idx="1">
+            <a:schemeClr val="accent1"/>
+          </a:lnRef>
+          <a:fillRef idx="0">
+            <a:schemeClr val="accent1"/>
+          </a:fillRef>
+          <a:effectRef idx="0">
+            <a:schemeClr val="accent1"/>
+          </a:effectRef>
+          <a:fontRef idx="minor">
+            <a:schemeClr val="tx1"/>
+          </a:fontRef>
+        </p:style>
+      </p:cxnSp>
+      <p:sp>
+        <p:nvSpPr>
+          <p:cNvPr id="51" name="Rectangle 50"/>
+          <p:cNvSpPr/>
+          <p:nvPr/>
+        </p:nvSpPr>
+        <p:spPr>
+          <a:xfrm>
+            <a:off x="6586701" y="3707176"/>
+            <a:ext cx="1591940" cy="818920"/>
+          </a:xfrm>
+          <a:prstGeom prst="rect">
+            <a:avLst/>
+          </a:prstGeom>
+        </p:spPr>
+        <p:style>
+          <a:lnRef idx="2">
+            <a:schemeClr val="accent1">
+              <a:shade val="50000"/>
+            </a:schemeClr>
+          </a:lnRef>
+          <a:fillRef idx="1">
+            <a:schemeClr val="accent1"/>
+          </a:fillRef>
+          <a:effectRef idx="0">
+            <a:schemeClr val="accent1"/>
+          </a:effectRef>
+          <a:fontRef idx="minor">
+            <a:schemeClr val="lt1"/>
+          </a:fontRef>
+        </p:style>
+        <p:txBody>
+          <a:bodyPr rtlCol="0" anchor="ctr"/>
+          <a:lstStyle/>
+          <a:p>
+            <a:pPr algn="ctr"/>
+            <a:r>
+              <a:rPr lang="en-US" dirty="0" smtClean="0"/>
+              <a:t>Reception</a:t>
+            </a:r>
+            <a:endParaRPr lang="en-US" dirty="0"/>
+          </a:p>
+        </p:txBody>
+      </p:sp>
+      <p:sp>
+        <p:nvSpPr>
+          <p:cNvPr id="52" name="Rectangle 51"/>
+          <p:cNvSpPr/>
+          <p:nvPr/>
+        </p:nvSpPr>
+        <p:spPr>
+          <a:xfrm>
+            <a:off x="9768744" y="3707176"/>
+            <a:ext cx="1591940" cy="818920"/>
+          </a:xfrm>
+          <a:prstGeom prst="rect">
+            <a:avLst/>
+          </a:prstGeom>
+        </p:spPr>
+        <p:style>
+          <a:lnRef idx="2">
+            <a:schemeClr val="accent1">
+              <a:shade val="50000"/>
+            </a:schemeClr>
+          </a:lnRef>
+          <a:fillRef idx="1">
+            <a:schemeClr val="accent1"/>
+          </a:fillRef>
+          <a:effectRef idx="0">
+            <a:schemeClr val="accent1"/>
+          </a:effectRef>
+          <a:fontRef idx="minor">
+            <a:schemeClr val="lt1"/>
+          </a:fontRef>
+        </p:style>
+        <p:txBody>
+          <a:bodyPr rtlCol="0" anchor="ctr"/>
+          <a:lstStyle/>
+          <a:p>
+            <a:pPr algn="ctr"/>
+            <a:r>
+              <a:rPr lang="en-US" dirty="0" smtClean="0"/>
+              <a:t>Full Time Missionaries</a:t>
+            </a:r>
+            <a:endParaRPr lang="en-US" dirty="0"/>
+          </a:p>
+        </p:txBody>
+      </p:sp>
+      <p:sp>
+        <p:nvSpPr>
+          <p:cNvPr id="54" name="Oval 53"/>
+          <p:cNvSpPr/>
+          <p:nvPr/>
+        </p:nvSpPr>
+        <p:spPr>
+          <a:xfrm>
+            <a:off x="5710662" y="4937390"/>
+            <a:ext cx="1388126" cy="627961"/>
+          </a:xfrm>
+          <a:prstGeom prst="ellipse">
+            <a:avLst/>
+          </a:prstGeom>
+          <a:solidFill>
+            <a:schemeClr val="accent6">
+              <a:lumMod val="40000"/>
+              <a:lumOff val="60000"/>
+            </a:schemeClr>
+          </a:solidFill>
+          <a:ln>
+            <a:solidFill>
+              <a:schemeClr val="accent6">
+                <a:lumMod val="40000"/>
+                <a:lumOff val="60000"/>
+              </a:schemeClr>
+            </a:solidFill>
+          </a:ln>
+        </p:spPr>
+        <p:style>
+          <a:lnRef idx="2">
+            <a:schemeClr val="accent1">
+              <a:shade val="50000"/>
+            </a:schemeClr>
+          </a:lnRef>
+          <a:fillRef idx="1">
+            <a:schemeClr val="accent1"/>
+          </a:fillRef>
+          <a:effectRef idx="0">
+            <a:schemeClr val="accent1"/>
+          </a:effectRef>
+          <a:fontRef idx="minor">
+            <a:schemeClr val="lt1"/>
+          </a:fontRef>
+        </p:style>
+        <p:txBody>
+          <a:bodyPr rtlCol="0" anchor="ctr"/>
+          <a:lstStyle/>
+          <a:p>
+            <a:pPr algn="ctr"/>
+            <a:r>
+              <a:rPr lang="en-US" sz="1600" dirty="0" smtClean="0">
+                <a:solidFill>
+                  <a:schemeClr val="tx1"/>
+                </a:solidFill>
+              </a:rPr>
+              <a:t>Wedding Info</a:t>
+            </a:r>
+            <a:endParaRPr lang="en-US" sz="1600" dirty="0">
+              <a:solidFill>
+                <a:schemeClr val="tx1"/>
+              </a:solidFill>
+            </a:endParaRPr>
+          </a:p>
+        </p:txBody>
+      </p:sp>
+      <p:sp>
+        <p:nvSpPr>
+          <p:cNvPr id="55" name="Oval 54"/>
+          <p:cNvSpPr/>
+          <p:nvPr/>
+        </p:nvSpPr>
+        <p:spPr>
+          <a:xfrm>
+            <a:off x="6502344" y="5339513"/>
+            <a:ext cx="1793893" cy="627961"/>
+          </a:xfrm>
+          <a:prstGeom prst="ellipse">
+            <a:avLst/>
+          </a:prstGeom>
+          <a:solidFill>
+            <a:schemeClr val="accent6">
+              <a:lumMod val="40000"/>
+              <a:lumOff val="60000"/>
+            </a:schemeClr>
+          </a:solidFill>
+          <a:ln>
+            <a:solidFill>
+              <a:schemeClr val="accent6">
+                <a:lumMod val="40000"/>
+                <a:lumOff val="60000"/>
+              </a:schemeClr>
+            </a:solidFill>
+          </a:ln>
+        </p:spPr>
+        <p:style>
+          <a:lnRef idx="2">
+            <a:schemeClr val="accent1">
+              <a:shade val="50000"/>
+            </a:schemeClr>
+          </a:lnRef>
+          <a:fillRef idx="1">
+            <a:schemeClr val="accent1"/>
+          </a:fillRef>
+          <a:effectRef idx="0">
+            <a:schemeClr val="accent1"/>
+          </a:effectRef>
+          <a:fontRef idx="minor">
+            <a:schemeClr val="lt1"/>
+          </a:fontRef>
+        </p:style>
+        <p:txBody>
+          <a:bodyPr rtlCol="0" anchor="ctr"/>
+          <a:lstStyle/>
+          <a:p>
+            <a:pPr algn="ctr"/>
+            <a:r>
+              <a:rPr lang="en-US" sz="1200" dirty="0" smtClean="0">
+                <a:solidFill>
+                  <a:schemeClr val="tx1"/>
+                </a:solidFill>
+              </a:rPr>
+              <a:t>Accommodation</a:t>
+            </a:r>
+            <a:endParaRPr lang="en-US" sz="3600" dirty="0">
+              <a:solidFill>
+                <a:schemeClr val="tx1"/>
+              </a:solidFill>
+            </a:endParaRPr>
+          </a:p>
+        </p:txBody>
+      </p:sp>
+      <p:sp>
+        <p:nvSpPr>
+          <p:cNvPr id="56" name="Oval 55"/>
+          <p:cNvSpPr/>
+          <p:nvPr/>
+        </p:nvSpPr>
+        <p:spPr>
+          <a:xfrm>
+            <a:off x="7518394" y="4854765"/>
+            <a:ext cx="1388126" cy="627961"/>
+          </a:xfrm>
+          <a:prstGeom prst="ellipse">
+            <a:avLst/>
+          </a:prstGeom>
+          <a:solidFill>
+            <a:schemeClr val="accent6">
+              <a:lumMod val="40000"/>
+              <a:lumOff val="60000"/>
+            </a:schemeClr>
+          </a:solidFill>
+          <a:ln>
+            <a:solidFill>
+              <a:schemeClr val="accent6">
+                <a:lumMod val="40000"/>
+                <a:lumOff val="60000"/>
+              </a:schemeClr>
+            </a:solidFill>
+          </a:ln>
+        </p:spPr>
+        <p:style>
+          <a:lnRef idx="2">
+            <a:schemeClr val="accent1">
+              <a:shade val="50000"/>
+            </a:schemeClr>
+          </a:lnRef>
+          <a:fillRef idx="1">
+            <a:schemeClr val="accent1"/>
+          </a:fillRef>
+          <a:effectRef idx="0">
+            <a:schemeClr val="accent1"/>
+          </a:effectRef>
+          <a:fontRef idx="minor">
+            <a:schemeClr val="lt1"/>
+          </a:fontRef>
+        </p:style>
+        <p:txBody>
+          <a:bodyPr rtlCol="0" anchor="ctr"/>
+          <a:lstStyle/>
+          <a:p>
+            <a:pPr algn="ctr"/>
+            <a:r>
+              <a:rPr lang="en-US" dirty="0" smtClean="0">
+                <a:solidFill>
+                  <a:schemeClr val="tx1"/>
+                </a:solidFill>
+              </a:rPr>
+              <a:t>Food Service</a:t>
+            </a:r>
+            <a:endParaRPr lang="en-US" dirty="0">
+              <a:solidFill>
+                <a:schemeClr val="tx1"/>
+              </a:solidFill>
+            </a:endParaRPr>
+          </a:p>
+        </p:txBody>
+      </p:sp>
+      <p:sp>
+        <p:nvSpPr>
+          <p:cNvPr id="57" name="Oval 56"/>
+          <p:cNvSpPr/>
+          <p:nvPr/>
+        </p:nvSpPr>
+        <p:spPr>
+          <a:xfrm>
+            <a:off x="10755700" y="5504749"/>
+            <a:ext cx="1388126" cy="627961"/>
+          </a:xfrm>
+          <a:prstGeom prst="ellipse">
+            <a:avLst/>
+          </a:prstGeom>
+          <a:solidFill>
+            <a:schemeClr val="accent6">
+              <a:lumMod val="40000"/>
+              <a:lumOff val="60000"/>
+            </a:schemeClr>
+          </a:solidFill>
+          <a:ln>
+            <a:solidFill>
+              <a:schemeClr val="accent6">
+                <a:lumMod val="40000"/>
+                <a:lumOff val="60000"/>
+              </a:schemeClr>
+            </a:solidFill>
+          </a:ln>
+        </p:spPr>
+        <p:style>
+          <a:lnRef idx="2">
+            <a:schemeClr val="accent1">
+              <a:shade val="50000"/>
+            </a:schemeClr>
+          </a:lnRef>
+          <a:fillRef idx="1">
+            <a:schemeClr val="accent1"/>
+          </a:fillRef>
+          <a:effectRef idx="0">
+            <a:schemeClr val="accent1"/>
+          </a:effectRef>
+          <a:fontRef idx="minor">
+            <a:schemeClr val="lt1"/>
+          </a:fontRef>
+        </p:style>
+        <p:txBody>
+          <a:bodyPr rtlCol="0" anchor="ctr"/>
+          <a:lstStyle/>
+          <a:p>
+            <a:pPr algn="ctr"/>
+            <a:r>
+              <a:rPr lang="en-US" dirty="0" smtClean="0">
+                <a:solidFill>
+                  <a:schemeClr val="tx1"/>
+                </a:solidFill>
+              </a:rPr>
+              <a:t>Contact info</a:t>
+            </a:r>
+            <a:endParaRPr lang="en-US" dirty="0">
+              <a:solidFill>
+                <a:schemeClr val="tx1"/>
+              </a:solidFill>
+            </a:endParaRPr>
+          </a:p>
+        </p:txBody>
+      </p:sp>
+      <p:sp>
+        <p:nvSpPr>
+          <p:cNvPr id="58" name="Oval 57"/>
+          <p:cNvSpPr/>
+          <p:nvPr/>
+        </p:nvSpPr>
+        <p:spPr>
+          <a:xfrm>
+            <a:off x="8901189" y="5504750"/>
+            <a:ext cx="1388126" cy="627961"/>
+          </a:xfrm>
+          <a:prstGeom prst="ellipse">
+            <a:avLst/>
+          </a:prstGeom>
+          <a:solidFill>
+            <a:schemeClr val="accent6">
+              <a:lumMod val="40000"/>
+              <a:lumOff val="60000"/>
+            </a:schemeClr>
+          </a:solidFill>
+          <a:ln>
+            <a:solidFill>
+              <a:schemeClr val="accent6">
+                <a:lumMod val="40000"/>
+                <a:lumOff val="60000"/>
+              </a:schemeClr>
+            </a:solidFill>
+          </a:ln>
+        </p:spPr>
+        <p:style>
+          <a:lnRef idx="2">
+            <a:schemeClr val="accent1">
+              <a:shade val="50000"/>
+            </a:schemeClr>
+          </a:lnRef>
+          <a:fillRef idx="1">
+            <a:schemeClr val="accent1"/>
+          </a:fillRef>
+          <a:effectRef idx="0">
+            <a:schemeClr val="accent1"/>
+          </a:effectRef>
+          <a:fontRef idx="minor">
+            <a:schemeClr val="lt1"/>
+          </a:fontRef>
+        </p:style>
+        <p:txBody>
+          <a:bodyPr rtlCol="0" anchor="ctr"/>
+          <a:lstStyle/>
+          <a:p>
+            <a:pPr algn="ctr"/>
+            <a:r>
+              <a:rPr lang="en-US" dirty="0" smtClean="0">
+                <a:solidFill>
+                  <a:schemeClr val="tx1"/>
+                </a:solidFill>
+              </a:rPr>
+              <a:t>Info Suites</a:t>
+            </a:r>
+            <a:endParaRPr lang="en-US" dirty="0">
+              <a:solidFill>
+                <a:schemeClr val="tx1"/>
+              </a:solidFill>
+            </a:endParaRPr>
+          </a:p>
+        </p:txBody>
+      </p:sp>
+      <p:sp>
+        <p:nvSpPr>
+          <p:cNvPr id="59" name="Oval 58"/>
+          <p:cNvSpPr/>
+          <p:nvPr/>
+        </p:nvSpPr>
+        <p:spPr>
+          <a:xfrm>
+            <a:off x="9829338" y="5054884"/>
+            <a:ext cx="1424108" cy="627961"/>
+          </a:xfrm>
+          <a:prstGeom prst="ellipse">
+            <a:avLst/>
+          </a:prstGeom>
+          <a:solidFill>
+            <a:schemeClr val="accent6">
+              <a:lumMod val="40000"/>
+              <a:lumOff val="60000"/>
+            </a:schemeClr>
+          </a:solidFill>
+          <a:ln>
+            <a:solidFill>
+              <a:schemeClr val="accent6">
+                <a:lumMod val="40000"/>
+                <a:lumOff val="60000"/>
+              </a:schemeClr>
+            </a:solidFill>
+          </a:ln>
+        </p:spPr>
+        <p:style>
+          <a:lnRef idx="2">
+            <a:schemeClr val="accent1">
+              <a:shade val="50000"/>
+            </a:schemeClr>
+          </a:lnRef>
+          <a:fillRef idx="1">
+            <a:schemeClr val="accent1"/>
+          </a:fillRef>
+          <a:effectRef idx="0">
+            <a:schemeClr val="accent1"/>
+          </a:effectRef>
+          <a:fontRef idx="minor">
+            <a:schemeClr val="lt1"/>
+          </a:fontRef>
+        </p:style>
+        <p:txBody>
+          <a:bodyPr rtlCol="0" anchor="ctr"/>
+          <a:lstStyle/>
+          <a:p>
+            <a:pPr algn="ctr"/>
+            <a:r>
+              <a:rPr lang="en-US" dirty="0" smtClean="0">
+                <a:solidFill>
+                  <a:schemeClr val="tx1"/>
+                </a:solidFill>
+              </a:rPr>
+              <a:t>Images / Layouts</a:t>
+            </a:r>
+            <a:endParaRPr lang="en-US" dirty="0">
+              <a:solidFill>
+                <a:schemeClr val="tx1"/>
+              </a:solidFill>
+            </a:endParaRPr>
+          </a:p>
+        </p:txBody>
+      </p:sp>
+      <p:cxnSp>
+        <p:nvCxnSpPr>
+          <p:cNvPr id="63" name="Elbow Connector 62"/>
+          <p:cNvCxnSpPr>
+            <a:stCxn id="6" idx="2"/>
+            <a:endCxn id="51" idx="0"/>
+          </p:cNvCxnSpPr>
+          <p:nvPr/>
+        </p:nvCxnSpPr>
+        <p:spPr>
+          <a:xfrm rot="5400000">
+            <a:off x="7993190" y="2606402"/>
+            <a:ext cx="490255" cy="1711292"/>
+          </a:xfrm>
+          <a:prstGeom prst="bentConnector3">
+            <a:avLst/>
+          </a:prstGeom>
+          <a:ln>
+            <a:solidFill>
+              <a:schemeClr val="accent2"/>
+            </a:solidFill>
+            <a:tailEnd type="triangle"/>
+          </a:ln>
+        </p:spPr>
+        <p:style>
+          <a:lnRef idx="1">
+            <a:schemeClr val="accent1"/>
+          </a:lnRef>
+          <a:fillRef idx="0">
+            <a:schemeClr val="accent1"/>
+          </a:fillRef>
+          <a:effectRef idx="0">
+            <a:schemeClr val="accent1"/>
+          </a:effectRef>
+          <a:fontRef idx="minor">
+            <a:schemeClr val="tx1"/>
+          </a:fontRef>
+        </p:style>
+      </p:cxnSp>
+      <p:cxnSp>
+        <p:nvCxnSpPr>
+          <p:cNvPr id="65" name="Elbow Connector 64"/>
+          <p:cNvCxnSpPr>
+            <a:stCxn id="6" idx="2"/>
+            <a:endCxn id="52" idx="0"/>
+          </p:cNvCxnSpPr>
+          <p:nvPr/>
+        </p:nvCxnSpPr>
+        <p:spPr>
+          <a:xfrm rot="16200000" flipH="1">
+            <a:off x="9584211" y="2726672"/>
+            <a:ext cx="490255" cy="1470751"/>
+          </a:xfrm>
+          <a:prstGeom prst="bentConnector3">
+            <a:avLst/>
+          </a:prstGeom>
+          <a:ln>
+            <a:solidFill>
+              <a:schemeClr val="accent2"/>
+            </a:solidFill>
+            <a:tailEnd type="triangle"/>
+          </a:ln>
+        </p:spPr>
+        <p:style>
+          <a:lnRef idx="1">
+            <a:schemeClr val="accent1"/>
+          </a:lnRef>
+          <a:fillRef idx="0">
+            <a:schemeClr val="accent1"/>
+          </a:fillRef>
+          <a:effectRef idx="0">
+            <a:schemeClr val="accent1"/>
+          </a:effectRef>
+          <a:fontRef idx="minor">
+            <a:schemeClr val="tx1"/>
+          </a:fontRef>
+        </p:style>
+      </p:cxnSp>
+      <p:cxnSp>
+        <p:nvCxnSpPr>
+          <p:cNvPr id="67" name="Straight Connector 66"/>
+          <p:cNvCxnSpPr>
+            <a:stCxn id="8" idx="2"/>
+            <a:endCxn id="21" idx="0"/>
+          </p:cNvCxnSpPr>
+          <p:nvPr/>
+        </p:nvCxnSpPr>
+        <p:spPr>
+          <a:xfrm flipH="1">
+            <a:off x="2394001" y="3216921"/>
+            <a:ext cx="12264" cy="1263264"/>
+          </a:xfrm>
+          <a:prstGeom prst="line">
+            <a:avLst/>
+          </a:prstGeom>
+        </p:spPr>
+        <p:style>
+          <a:lnRef idx="1">
+            <a:schemeClr val="accent1"/>
+          </a:lnRef>
+          <a:fillRef idx="0">
+            <a:schemeClr val="accent1"/>
+          </a:fillRef>
+          <a:effectRef idx="0">
+            <a:schemeClr val="accent1"/>
+          </a:effectRef>
+          <a:fontRef idx="minor">
+            <a:schemeClr val="tx1"/>
+          </a:fontRef>
+        </p:style>
+      </p:cxnSp>
+      <p:cxnSp>
+        <p:nvCxnSpPr>
+          <p:cNvPr id="72" name="Straight Connector 71"/>
+          <p:cNvCxnSpPr>
+            <a:stCxn id="52" idx="2"/>
+            <a:endCxn id="57" idx="0"/>
+          </p:cNvCxnSpPr>
+          <p:nvPr/>
+        </p:nvCxnSpPr>
+        <p:spPr>
+          <a:xfrm>
+            <a:off x="10564714" y="4526096"/>
+            <a:ext cx="885049" cy="978653"/>
+          </a:xfrm>
+          <a:prstGeom prst="line">
+            <a:avLst/>
+          </a:prstGeom>
+        </p:spPr>
+        <p:style>
+          <a:lnRef idx="1">
+            <a:schemeClr val="accent1"/>
+          </a:lnRef>
+          <a:fillRef idx="0">
+            <a:schemeClr val="accent1"/>
+          </a:fillRef>
+          <a:effectRef idx="0">
+            <a:schemeClr val="accent1"/>
+          </a:effectRef>
+          <a:fontRef idx="minor">
+            <a:schemeClr val="tx1"/>
+          </a:fontRef>
+        </p:style>
+      </p:cxnSp>
+      <p:cxnSp>
+        <p:nvCxnSpPr>
+          <p:cNvPr id="75" name="Straight Connector 74"/>
+          <p:cNvCxnSpPr>
+            <a:stCxn id="59" idx="0"/>
+            <a:endCxn id="52" idx="2"/>
+          </p:cNvCxnSpPr>
+          <p:nvPr/>
+        </p:nvCxnSpPr>
+        <p:spPr>
+          <a:xfrm flipV="1">
+            <a:off x="10541392" y="4526096"/>
+            <a:ext cx="23322" cy="528788"/>
+          </a:xfrm>
+          <a:prstGeom prst="line">
+            <a:avLst/>
+          </a:prstGeom>
+        </p:spPr>
+        <p:style>
+          <a:lnRef idx="1">
+            <a:schemeClr val="accent1"/>
+          </a:lnRef>
+          <a:fillRef idx="0">
+            <a:schemeClr val="accent1"/>
+          </a:fillRef>
+          <a:effectRef idx="0">
+            <a:schemeClr val="accent1"/>
+          </a:effectRef>
+          <a:fontRef idx="minor">
+            <a:schemeClr val="tx1"/>
+          </a:fontRef>
+        </p:style>
+      </p:cxnSp>
+      <p:cxnSp>
+        <p:nvCxnSpPr>
+          <p:cNvPr id="77" name="Straight Connector 76"/>
+          <p:cNvCxnSpPr>
+            <a:stCxn id="58" idx="0"/>
+            <a:endCxn id="52" idx="2"/>
+          </p:cNvCxnSpPr>
+          <p:nvPr/>
+        </p:nvCxnSpPr>
+        <p:spPr>
+          <a:xfrm flipV="1">
+            <a:off x="9595252" y="4526096"/>
+            <a:ext cx="969462" cy="978654"/>
+          </a:xfrm>
+          <a:prstGeom prst="line">
+            <a:avLst/>
+          </a:prstGeom>
+        </p:spPr>
+        <p:style>
+          <a:lnRef idx="1">
+            <a:schemeClr val="accent1"/>
+          </a:lnRef>
+          <a:fillRef idx="0">
+            <a:schemeClr val="accent1"/>
+          </a:fillRef>
+          <a:effectRef idx="0">
+            <a:schemeClr val="accent1"/>
+          </a:effectRef>
+          <a:fontRef idx="minor">
+            <a:schemeClr val="tx1"/>
+          </a:fontRef>
+        </p:style>
+      </p:cxnSp>
+      <p:cxnSp>
+        <p:nvCxnSpPr>
+          <p:cNvPr id="79" name="Straight Connector 78"/>
+          <p:cNvCxnSpPr>
+            <a:stCxn id="23" idx="0"/>
+            <a:endCxn id="8" idx="2"/>
+          </p:cNvCxnSpPr>
+          <p:nvPr/>
+        </p:nvCxnSpPr>
+        <p:spPr>
+          <a:xfrm flipH="1" flipV="1">
+            <a:off x="2406265" y="3216921"/>
+            <a:ext cx="957198" cy="1683737"/>
+          </a:xfrm>
+          <a:prstGeom prst="line">
+            <a:avLst/>
+          </a:prstGeom>
+        </p:spPr>
+        <p:style>
+          <a:lnRef idx="1">
+            <a:schemeClr val="accent1"/>
+          </a:lnRef>
+          <a:fillRef idx="0">
+            <a:schemeClr val="accent1"/>
+          </a:fillRef>
+          <a:effectRef idx="0">
+            <a:schemeClr val="accent1"/>
+          </a:effectRef>
+          <a:fontRef idx="minor">
+            <a:schemeClr val="tx1"/>
+          </a:fontRef>
+        </p:style>
+      </p:cxnSp>
+      <p:cxnSp>
+        <p:nvCxnSpPr>
+          <p:cNvPr id="81" name="Straight Connector 80"/>
+          <p:cNvCxnSpPr>
+            <a:stCxn id="22" idx="0"/>
+            <a:endCxn id="8" idx="2"/>
+          </p:cNvCxnSpPr>
+          <p:nvPr/>
+        </p:nvCxnSpPr>
+        <p:spPr>
+          <a:xfrm flipV="1">
+            <a:off x="1370585" y="3216921"/>
+            <a:ext cx="1035680" cy="1608458"/>
+          </a:xfrm>
+          <a:prstGeom prst="line">
+            <a:avLst/>
+          </a:prstGeom>
+        </p:spPr>
+        <p:style>
+          <a:lnRef idx="1">
+            <a:schemeClr val="accent1"/>
+          </a:lnRef>
+          <a:fillRef idx="0">
+            <a:schemeClr val="accent1"/>
+          </a:fillRef>
+          <a:effectRef idx="0">
+            <a:schemeClr val="accent1"/>
+          </a:effectRef>
+          <a:fontRef idx="minor">
+            <a:schemeClr val="tx1"/>
+          </a:fontRef>
+        </p:style>
+      </p:cxnSp>
+      <p:cxnSp>
+        <p:nvCxnSpPr>
+          <p:cNvPr id="83" name="Straight Connector 82"/>
+          <p:cNvCxnSpPr>
+            <a:stCxn id="19" idx="0"/>
+            <a:endCxn id="5" idx="2"/>
+          </p:cNvCxnSpPr>
+          <p:nvPr/>
+        </p:nvCxnSpPr>
+        <p:spPr>
+          <a:xfrm flipV="1">
+            <a:off x="4120992" y="3209590"/>
+            <a:ext cx="991750" cy="609572"/>
+          </a:xfrm>
+          <a:prstGeom prst="line">
+            <a:avLst/>
+          </a:prstGeom>
+        </p:spPr>
+        <p:style>
+          <a:lnRef idx="1">
+            <a:schemeClr val="accent1"/>
+          </a:lnRef>
+          <a:fillRef idx="0">
+            <a:schemeClr val="accent1"/>
+          </a:fillRef>
+          <a:effectRef idx="0">
+            <a:schemeClr val="accent1"/>
+          </a:effectRef>
+          <a:fontRef idx="minor">
+            <a:schemeClr val="tx1"/>
+          </a:fontRef>
+        </p:style>
+      </p:cxnSp>
+      <p:cxnSp>
+        <p:nvCxnSpPr>
+          <p:cNvPr id="85" name="Straight Connector 84"/>
+          <p:cNvCxnSpPr>
+            <a:stCxn id="20" idx="0"/>
+            <a:endCxn id="5" idx="2"/>
+          </p:cNvCxnSpPr>
+          <p:nvPr/>
+        </p:nvCxnSpPr>
+        <p:spPr>
+          <a:xfrm flipH="1" flipV="1">
+            <a:off x="5112742" y="3209590"/>
+            <a:ext cx="12855" cy="1011696"/>
+          </a:xfrm>
+          <a:prstGeom prst="line">
+            <a:avLst/>
+          </a:prstGeom>
+        </p:spPr>
+        <p:style>
+          <a:lnRef idx="1">
+            <a:schemeClr val="accent1"/>
+          </a:lnRef>
+          <a:fillRef idx="0">
+            <a:schemeClr val="accent1"/>
+          </a:fillRef>
+          <a:effectRef idx="0">
+            <a:schemeClr val="accent1"/>
+          </a:effectRef>
+          <a:fontRef idx="minor">
+            <a:schemeClr val="tx1"/>
+          </a:fontRef>
+        </p:style>
+      </p:cxnSp>
+      <p:cxnSp>
+        <p:nvCxnSpPr>
+          <p:cNvPr id="87" name="Straight Connector 86"/>
+          <p:cNvCxnSpPr>
+            <a:stCxn id="18" idx="0"/>
+            <a:endCxn id="5" idx="2"/>
+          </p:cNvCxnSpPr>
+          <p:nvPr/>
+        </p:nvCxnSpPr>
+        <p:spPr>
+          <a:xfrm flipH="1" flipV="1">
+            <a:off x="5112742" y="3209590"/>
+            <a:ext cx="779896" cy="572859"/>
+          </a:xfrm>
+          <a:prstGeom prst="line">
+            <a:avLst/>
+          </a:prstGeom>
+        </p:spPr>
+        <p:style>
+          <a:lnRef idx="1">
+            <a:schemeClr val="accent1"/>
+          </a:lnRef>
+          <a:fillRef idx="0">
+            <a:schemeClr val="accent1"/>
+          </a:fillRef>
+          <a:effectRef idx="0">
+            <a:schemeClr val="accent1"/>
+          </a:effectRef>
+          <a:fontRef idx="minor">
+            <a:schemeClr val="tx1"/>
+          </a:fontRef>
+        </p:style>
+      </p:cxnSp>
+      <p:cxnSp>
+        <p:nvCxnSpPr>
+          <p:cNvPr id="89" name="Straight Connector 88"/>
+          <p:cNvCxnSpPr>
+            <a:stCxn id="54" idx="0"/>
+            <a:endCxn id="51" idx="2"/>
+          </p:cNvCxnSpPr>
+          <p:nvPr/>
+        </p:nvCxnSpPr>
+        <p:spPr>
+          <a:xfrm flipV="1">
+            <a:off x="6404725" y="4526096"/>
+            <a:ext cx="977946" cy="411294"/>
+          </a:xfrm>
+          <a:prstGeom prst="line">
+            <a:avLst/>
+          </a:prstGeom>
+        </p:spPr>
+        <p:style>
+          <a:lnRef idx="1">
+            <a:schemeClr val="accent1"/>
+          </a:lnRef>
+          <a:fillRef idx="0">
+            <a:schemeClr val="accent1"/>
+          </a:fillRef>
+          <a:effectRef idx="0">
+            <a:schemeClr val="accent1"/>
+          </a:effectRef>
+          <a:fontRef idx="minor">
+            <a:schemeClr val="tx1"/>
+          </a:fontRef>
+        </p:style>
+      </p:cxnSp>
+      <p:cxnSp>
+        <p:nvCxnSpPr>
+          <p:cNvPr id="91" name="Straight Connector 90"/>
+          <p:cNvCxnSpPr>
+            <a:stCxn id="55" idx="0"/>
+            <a:endCxn id="51" idx="2"/>
+          </p:cNvCxnSpPr>
+          <p:nvPr/>
+        </p:nvCxnSpPr>
+        <p:spPr>
+          <a:xfrm flipH="1" flipV="1">
+            <a:off x="7382671" y="4526096"/>
+            <a:ext cx="16620" cy="813417"/>
+          </a:xfrm>
+          <a:prstGeom prst="line">
+            <a:avLst/>
+          </a:prstGeom>
+        </p:spPr>
+        <p:style>
+          <a:lnRef idx="1">
+            <a:schemeClr val="accent1"/>
+          </a:lnRef>
+          <a:fillRef idx="0">
+            <a:schemeClr val="accent1"/>
+          </a:fillRef>
+          <a:effectRef idx="0">
+            <a:schemeClr val="accent1"/>
+          </a:effectRef>
+          <a:fontRef idx="minor">
+            <a:schemeClr val="tx1"/>
+          </a:fontRef>
+        </p:style>
+      </p:cxnSp>
+      <p:cxnSp>
+        <p:nvCxnSpPr>
+          <p:cNvPr id="93" name="Straight Connector 92"/>
+          <p:cNvCxnSpPr>
+            <a:stCxn id="56" idx="0"/>
+            <a:endCxn id="51" idx="2"/>
+          </p:cNvCxnSpPr>
+          <p:nvPr/>
+        </p:nvCxnSpPr>
+        <p:spPr>
+          <a:xfrm flipH="1" flipV="1">
+            <a:off x="7382671" y="4526096"/>
+            <a:ext cx="829786" cy="328669"/>
+          </a:xfrm>
+          <a:prstGeom prst="line">
+            <a:avLst/>
+          </a:prstGeom>
+        </p:spPr>
+        <p:style>
+          <a:lnRef idx="1">
+            <a:schemeClr val="accent1"/>
+          </a:lnRef>
+          <a:fillRef idx="0">
+            <a:schemeClr val="accent1"/>
+          </a:fillRef>
+          <a:effectRef idx="0">
+            <a:schemeClr val="accent1"/>
+          </a:effectRef>
+          <a:fontRef idx="minor">
+            <a:schemeClr val="tx1"/>
+          </a:fontRef>
+        </p:style>
+      </p:cxnSp>
+      <p:cxnSp>
+        <p:nvCxnSpPr>
+          <p:cNvPr id="95" name="Straight Connector 94"/>
+          <p:cNvCxnSpPr>
+            <a:stCxn id="17" idx="2"/>
+            <a:endCxn id="6" idx="3"/>
+          </p:cNvCxnSpPr>
+          <p:nvPr/>
+        </p:nvCxnSpPr>
+        <p:spPr>
+          <a:xfrm flipH="1" flipV="1">
+            <a:off x="9889933" y="2807461"/>
+            <a:ext cx="476936" cy="354380"/>
+          </a:xfrm>
+          <a:prstGeom prst="line">
+            <a:avLst/>
+          </a:prstGeom>
+        </p:spPr>
+        <p:style>
+          <a:lnRef idx="1">
+            <a:schemeClr val="accent1"/>
+          </a:lnRef>
+          <a:fillRef idx="0">
+            <a:schemeClr val="accent1"/>
+          </a:fillRef>
+          <a:effectRef idx="0">
+            <a:schemeClr val="accent1"/>
+          </a:effectRef>
+          <a:fontRef idx="minor">
+            <a:schemeClr val="tx1"/>
+          </a:fontRef>
+        </p:style>
+      </p:cxnSp>
+      <p:cxnSp>
+        <p:nvCxnSpPr>
+          <p:cNvPr id="97" name="Straight Connector 96"/>
+          <p:cNvCxnSpPr>
+            <a:stCxn id="16" idx="2"/>
+            <a:endCxn id="6" idx="3"/>
+          </p:cNvCxnSpPr>
+          <p:nvPr/>
+        </p:nvCxnSpPr>
+        <p:spPr>
+          <a:xfrm flipH="1">
+            <a:off x="9889933" y="2549486"/>
+            <a:ext cx="465919" cy="257975"/>
+          </a:xfrm>
+          <a:prstGeom prst="line">
+            <a:avLst/>
+          </a:prstGeom>
+        </p:spPr>
+        <p:style>
+          <a:lnRef idx="1">
+            <a:schemeClr val="accent1"/>
+          </a:lnRef>
+          <a:fillRef idx="0">
+            <a:schemeClr val="accent1"/>
+          </a:fillRef>
+          <a:effectRef idx="0">
+            <a:schemeClr val="accent1"/>
+          </a:effectRef>
+          <a:fontRef idx="minor">
+            <a:schemeClr val="tx1"/>
+          </a:fontRef>
+        </p:style>
+      </p:cxnSp>
+      <p:cxnSp>
+        <p:nvCxnSpPr>
+          <p:cNvPr id="100" name="Straight Connector 99"/>
+          <p:cNvCxnSpPr>
+            <a:stCxn id="15" idx="2"/>
+            <a:endCxn id="6" idx="3"/>
+          </p:cNvCxnSpPr>
+          <p:nvPr/>
+        </p:nvCxnSpPr>
+        <p:spPr>
+          <a:xfrm flipH="1">
+            <a:off x="9889933" y="1921525"/>
+            <a:ext cx="399382" cy="885936"/>
+          </a:xfrm>
+          <a:prstGeom prst="line">
+            <a:avLst/>
+          </a:prstGeom>
+        </p:spPr>
+        <p:style>
+          <a:lnRef idx="1">
+            <a:schemeClr val="accent1"/>
+          </a:lnRef>
+          <a:fillRef idx="0">
+            <a:schemeClr val="accent1"/>
+          </a:fillRef>
+          <a:effectRef idx="0">
+            <a:schemeClr val="accent1"/>
+          </a:effectRef>
+          <a:fontRef idx="minor">
+            <a:schemeClr val="tx1"/>
+          </a:fontRef>
+        </p:style>
+      </p:cxnSp>
+    </p:spTree>
+    <p:extLst>
+      <p:ext uri="{BB962C8B-B14F-4D97-AF65-F5344CB8AC3E}">
+        <p14:creationId xmlns:p14="http://schemas.microsoft.com/office/powerpoint/2010/main" val="3880559088"/>
+      </p:ext>
+    </p:extLst>
+  </p:cSld>
+  <p:clrMapOvr>
+    <a:masterClrMapping/>
+  </p:clrMapOvr>
+</p:sld>
+</file>
+
+<file path=ppt/slides/slide3.xml><?xml version="1.0" encoding="utf-8"?>
+<p:sld xmlns:a="http://schemas.openxmlformats.org/drawingml/2006/main" xmlns:r="http://schemas.openxmlformats.org/officeDocument/2006/relationships" xmlns:p="http://schemas.openxmlformats.org/presentationml/2006/main">
+  <p:cSld>
+    <p:spTree>
+      <p:nvGrpSpPr>
+        <p:cNvPr id="1" name=""/>
+        <p:cNvGrpSpPr/>
+        <p:nvPr/>
+      </p:nvGrpSpPr>
+      <p:grpSpPr>
+        <a:xfrm>
+          <a:off x="0" y="0"/>
+          <a:ext cx="0" cy="0"/>
+          <a:chOff x="0" y="0"/>
+          <a:chExt cx="0" cy="0"/>
+        </a:xfrm>
+      </p:grpSpPr>
+      <p:sp>
+        <p:nvSpPr>
+          <p:cNvPr id="4" name="TextBox 3"/>
+          <p:cNvSpPr txBox="1"/>
+          <p:nvPr/>
+        </p:nvSpPr>
+        <p:spPr>
+          <a:xfrm>
+            <a:off x="418641" y="286439"/>
+            <a:ext cx="1762699" cy="369332"/>
+          </a:xfrm>
+          <a:prstGeom prst="rect">
+            <a:avLst/>
+          </a:prstGeom>
+          <a:noFill/>
+        </p:spPr>
+        <p:txBody>
+          <a:bodyPr wrap="square" rtlCol="0">
+            <a:spAutoFit/>
+          </a:bodyPr>
+          <a:lstStyle/>
+          <a:p>
+            <a:r>
+              <a:rPr lang="en-US" dirty="0" smtClean="0"/>
+              <a:t>Max Grid view</a:t>
+            </a:r>
+            <a:endParaRPr lang="en-US" dirty="0"/>
+          </a:p>
+        </p:txBody>
+      </p:sp>
+      <p:sp>
+        <p:nvSpPr>
+          <p:cNvPr id="5" name="Rectangle 4"/>
+          <p:cNvSpPr/>
+          <p:nvPr/>
+        </p:nvSpPr>
+        <p:spPr>
+          <a:xfrm>
+            <a:off x="253388" y="655771"/>
+            <a:ext cx="2214390" cy="798456"/>
+          </a:xfrm>
+          <a:prstGeom prst="rect">
+            <a:avLst/>
+          </a:prstGeom>
+        </p:spPr>
+        <p:style>
+          <a:lnRef idx="2">
+            <a:schemeClr val="accent1">
+              <a:shade val="50000"/>
+            </a:schemeClr>
+          </a:lnRef>
+          <a:fillRef idx="1">
+            <a:schemeClr val="accent1"/>
+          </a:fillRef>
+          <a:effectRef idx="0">
+            <a:schemeClr val="accent1"/>
+          </a:effectRef>
+          <a:fontRef idx="minor">
+            <a:schemeClr val="lt1"/>
+          </a:fontRef>
+        </p:style>
+        <p:txBody>
+          <a:bodyPr rtlCol="0" anchor="ctr"/>
+          <a:lstStyle/>
+          <a:p>
+            <a:pPr algn="ctr"/>
+            <a:r>
+              <a:rPr lang="en-US" dirty="0" smtClean="0"/>
+              <a:t>Standard page header</a:t>
+            </a:r>
+            <a:endParaRPr lang="en-US" dirty="0"/>
+          </a:p>
+        </p:txBody>
+      </p:sp>
+      <p:sp>
+        <p:nvSpPr>
+          <p:cNvPr id="6" name="Rectangle 5"/>
+          <p:cNvSpPr/>
+          <p:nvPr/>
+        </p:nvSpPr>
+        <p:spPr>
+          <a:xfrm>
+            <a:off x="261843" y="3910341"/>
+            <a:ext cx="2214390" cy="798456"/>
+          </a:xfrm>
+          <a:prstGeom prst="rect">
+            <a:avLst/>
+          </a:prstGeom>
+        </p:spPr>
+        <p:style>
+          <a:lnRef idx="2">
+            <a:schemeClr val="accent1">
+              <a:shade val="50000"/>
+            </a:schemeClr>
+          </a:lnRef>
+          <a:fillRef idx="1">
+            <a:schemeClr val="accent1"/>
+          </a:fillRef>
+          <a:effectRef idx="0">
+            <a:schemeClr val="accent1"/>
+          </a:effectRef>
+          <a:fontRef idx="minor">
+            <a:schemeClr val="lt1"/>
+          </a:fontRef>
+        </p:style>
+        <p:txBody>
+          <a:bodyPr rtlCol="0" anchor="ctr"/>
+          <a:lstStyle/>
+          <a:p>
+            <a:pPr algn="ctr"/>
+            <a:r>
+              <a:rPr lang="en-US" dirty="0" smtClean="0"/>
+              <a:t>Standard page footer</a:t>
+            </a:r>
+            <a:endParaRPr lang="en-US" dirty="0"/>
+          </a:p>
+        </p:txBody>
+      </p:sp>
+      <p:sp>
+        <p:nvSpPr>
+          <p:cNvPr id="7" name="Rectangle 6"/>
+          <p:cNvSpPr/>
+          <p:nvPr/>
+        </p:nvSpPr>
+        <p:spPr>
+          <a:xfrm>
+            <a:off x="253388" y="1564395"/>
+            <a:ext cx="2214390" cy="2357610"/>
+          </a:xfrm>
+          <a:prstGeom prst="rect">
+            <a:avLst/>
+          </a:prstGeom>
+        </p:spPr>
+        <p:style>
+          <a:lnRef idx="2">
+            <a:schemeClr val="accent1">
+              <a:shade val="50000"/>
+            </a:schemeClr>
+          </a:lnRef>
+          <a:fillRef idx="1">
+            <a:schemeClr val="accent1"/>
+          </a:fillRef>
+          <a:effectRef idx="0">
+            <a:schemeClr val="accent1"/>
+          </a:effectRef>
+          <a:fontRef idx="minor">
+            <a:schemeClr val="lt1"/>
+          </a:fontRef>
+        </p:style>
+        <p:txBody>
+          <a:bodyPr rtlCol="0" anchor="ctr"/>
+          <a:lstStyle/>
+          <a:p>
+            <a:pPr algn="ctr"/>
+            <a:endParaRPr lang="en-US"/>
+          </a:p>
+        </p:txBody>
+      </p:sp>
+      <p:sp>
+        <p:nvSpPr>
+          <p:cNvPr id="11" name="Rectangle 10"/>
+          <p:cNvSpPr/>
+          <p:nvPr/>
+        </p:nvSpPr>
+        <p:spPr>
+          <a:xfrm>
+            <a:off x="363557" y="2683684"/>
+            <a:ext cx="638978" cy="407624"/>
+          </a:xfrm>
+          <a:prstGeom prst="rect">
+            <a:avLst/>
+          </a:prstGeom>
+          <a:solidFill>
+            <a:schemeClr val="accent2"/>
+          </a:solidFill>
+        </p:spPr>
+        <p:style>
+          <a:lnRef idx="2">
+            <a:schemeClr val="accent1">
+              <a:shade val="50000"/>
+            </a:schemeClr>
+          </a:lnRef>
+          <a:fillRef idx="1">
+            <a:schemeClr val="accent1"/>
+          </a:fillRef>
+          <a:effectRef idx="0">
+            <a:schemeClr val="accent1"/>
+          </a:effectRef>
+          <a:fontRef idx="minor">
+            <a:schemeClr val="lt1"/>
+          </a:fontRef>
+        </p:style>
+        <p:txBody>
+          <a:bodyPr rtlCol="0" anchor="ctr"/>
+          <a:lstStyle/>
+          <a:p>
+            <a:pPr algn="ctr"/>
+            <a:r>
+              <a:rPr lang="en-US" dirty="0" smtClean="0"/>
+              <a:t>CI</a:t>
+            </a:r>
+            <a:endParaRPr lang="en-US" dirty="0"/>
+          </a:p>
+        </p:txBody>
+      </p:sp>
+      <p:sp>
+        <p:nvSpPr>
+          <p:cNvPr id="12" name="Rectangle 11"/>
+          <p:cNvSpPr/>
+          <p:nvPr/>
+        </p:nvSpPr>
+        <p:spPr>
+          <a:xfrm>
+            <a:off x="1042930" y="2683684"/>
+            <a:ext cx="638978" cy="407624"/>
+          </a:xfrm>
+          <a:prstGeom prst="rect">
+            <a:avLst/>
+          </a:prstGeom>
+          <a:solidFill>
+            <a:schemeClr val="accent2"/>
+          </a:solidFill>
+        </p:spPr>
+        <p:style>
+          <a:lnRef idx="2">
+            <a:schemeClr val="accent1">
+              <a:shade val="50000"/>
+            </a:schemeClr>
+          </a:lnRef>
+          <a:fillRef idx="1">
+            <a:schemeClr val="accent1"/>
+          </a:fillRef>
+          <a:effectRef idx="0">
+            <a:schemeClr val="accent1"/>
+          </a:effectRef>
+          <a:fontRef idx="minor">
+            <a:schemeClr val="lt1"/>
+          </a:fontRef>
+        </p:style>
+        <p:txBody>
+          <a:bodyPr rtlCol="0" anchor="ctr"/>
+          <a:lstStyle/>
+          <a:p>
+            <a:pPr algn="ctr"/>
+            <a:r>
+              <a:rPr lang="en-US" dirty="0" smtClean="0"/>
+              <a:t>CI</a:t>
+            </a:r>
+            <a:endParaRPr lang="en-US" dirty="0"/>
+          </a:p>
+        </p:txBody>
+      </p:sp>
+      <p:sp>
+        <p:nvSpPr>
+          <p:cNvPr id="13" name="Rectangle 12"/>
+          <p:cNvSpPr/>
+          <p:nvPr/>
+        </p:nvSpPr>
+        <p:spPr>
+          <a:xfrm>
+            <a:off x="1714959" y="2683683"/>
+            <a:ext cx="638978" cy="1126581"/>
+          </a:xfrm>
+          <a:prstGeom prst="rect">
+            <a:avLst/>
+          </a:prstGeom>
+          <a:solidFill>
+            <a:schemeClr val="accent2"/>
+          </a:solidFill>
+        </p:spPr>
+        <p:style>
+          <a:lnRef idx="2">
+            <a:schemeClr val="accent1">
+              <a:shade val="50000"/>
+            </a:schemeClr>
+          </a:lnRef>
+          <a:fillRef idx="1">
+            <a:schemeClr val="accent1"/>
+          </a:fillRef>
+          <a:effectRef idx="0">
+            <a:schemeClr val="accent1"/>
+          </a:effectRef>
+          <a:fontRef idx="minor">
+            <a:schemeClr val="lt1"/>
+          </a:fontRef>
+        </p:style>
+        <p:txBody>
+          <a:bodyPr rtlCol="0" anchor="ctr"/>
+          <a:lstStyle/>
+          <a:p>
+            <a:pPr algn="ctr"/>
+            <a:r>
+              <a:rPr lang="en-US" dirty="0" smtClean="0"/>
+              <a:t>CI</a:t>
+            </a:r>
+            <a:endParaRPr lang="en-US" dirty="0"/>
+          </a:p>
+        </p:txBody>
+      </p:sp>
+      <p:sp>
+        <p:nvSpPr>
+          <p:cNvPr id="14" name="Rectangle 13"/>
+          <p:cNvSpPr/>
+          <p:nvPr/>
+        </p:nvSpPr>
+        <p:spPr>
+          <a:xfrm>
+            <a:off x="363556" y="3402641"/>
+            <a:ext cx="1318351" cy="407624"/>
+          </a:xfrm>
+          <a:prstGeom prst="rect">
+            <a:avLst/>
+          </a:prstGeom>
+          <a:solidFill>
+            <a:schemeClr val="accent2"/>
+          </a:solidFill>
+        </p:spPr>
+        <p:style>
+          <a:lnRef idx="2">
+            <a:schemeClr val="accent1">
+              <a:shade val="50000"/>
+            </a:schemeClr>
+          </a:lnRef>
+          <a:fillRef idx="1">
+            <a:schemeClr val="accent1"/>
+          </a:fillRef>
+          <a:effectRef idx="0">
+            <a:schemeClr val="accent1"/>
+          </a:effectRef>
+          <a:fontRef idx="minor">
+            <a:schemeClr val="lt1"/>
+          </a:fontRef>
+        </p:style>
+        <p:txBody>
+          <a:bodyPr rtlCol="0" anchor="ctr"/>
+          <a:lstStyle/>
+          <a:p>
+            <a:pPr algn="ctr"/>
+            <a:r>
+              <a:rPr lang="en-US" dirty="0" smtClean="0"/>
+              <a:t>CI</a:t>
+            </a:r>
+            <a:endParaRPr lang="en-US" dirty="0"/>
+          </a:p>
+        </p:txBody>
+      </p:sp>
+      <p:sp>
+        <p:nvSpPr>
+          <p:cNvPr id="17" name="TextBox 16"/>
+          <p:cNvSpPr txBox="1"/>
+          <p:nvPr/>
+        </p:nvSpPr>
+        <p:spPr>
+          <a:xfrm>
+            <a:off x="418641" y="1652530"/>
+            <a:ext cx="1762699" cy="369332"/>
+          </a:xfrm>
+          <a:prstGeom prst="rect">
+            <a:avLst/>
+          </a:prstGeom>
+          <a:noFill/>
+        </p:spPr>
+        <p:txBody>
+          <a:bodyPr wrap="square" rtlCol="0">
+            <a:spAutoFit/>
+          </a:bodyPr>
+          <a:lstStyle/>
+          <a:p>
+            <a:pPr algn="ctr"/>
+            <a:r>
+              <a:rPr lang="en-US" dirty="0" smtClean="0"/>
+              <a:t>Header</a:t>
+            </a:r>
+            <a:endParaRPr lang="en-US" dirty="0"/>
+          </a:p>
+        </p:txBody>
+      </p:sp>
+      <p:sp>
+        <p:nvSpPr>
+          <p:cNvPr id="19" name="Action Button: Custom 18">
+            <a:hlinkClick r:id="" action="ppaction://noaction" highlightClick="1"/>
+          </p:cNvPr>
+          <p:cNvSpPr/>
+          <p:nvPr/>
+        </p:nvSpPr>
+        <p:spPr>
+          <a:xfrm>
+            <a:off x="253388" y="1364523"/>
+            <a:ext cx="2214390" cy="269646"/>
+          </a:xfrm>
+          <a:prstGeom prst="actionButtonBlank">
+            <a:avLst/>
+          </a:prstGeom>
+          <a:ln>
+            <a:solidFill>
+              <a:schemeClr val="tx1">
+                <a:lumMod val="75000"/>
+                <a:lumOff val="25000"/>
+              </a:schemeClr>
+            </a:solidFill>
+          </a:ln>
+        </p:spPr>
+        <p:style>
+          <a:lnRef idx="2">
+            <a:schemeClr val="accent1">
+              <a:shade val="50000"/>
+            </a:schemeClr>
+          </a:lnRef>
+          <a:fillRef idx="1">
+            <a:schemeClr val="accent1"/>
+          </a:fillRef>
+          <a:effectRef idx="0">
+            <a:schemeClr val="accent1"/>
+          </a:effectRef>
+          <a:fontRef idx="minor">
+            <a:schemeClr val="lt1"/>
+          </a:fontRef>
+        </p:style>
+        <p:txBody>
+          <a:bodyPr rtlCol="0" anchor="ctr"/>
+          <a:lstStyle/>
+          <a:p>
+            <a:pPr algn="ctr"/>
+            <a:r>
+              <a:rPr lang="en-US" dirty="0" err="1" smtClean="0"/>
+              <a:t>Nav</a:t>
+            </a:r>
+            <a:r>
+              <a:rPr lang="en-US" dirty="0" smtClean="0"/>
+              <a:t> Bar</a:t>
+            </a:r>
+            <a:endParaRPr lang="en-US" dirty="0"/>
+          </a:p>
+        </p:txBody>
+      </p:sp>
+      <p:sp>
+        <p:nvSpPr>
+          <p:cNvPr id="20" name="TextBox 19"/>
+          <p:cNvSpPr txBox="1"/>
+          <p:nvPr/>
+        </p:nvSpPr>
+        <p:spPr>
+          <a:xfrm>
+            <a:off x="2650475" y="286439"/>
+            <a:ext cx="1915098" cy="369332"/>
+          </a:xfrm>
+          <a:prstGeom prst="rect">
+            <a:avLst/>
+          </a:prstGeom>
+          <a:noFill/>
+        </p:spPr>
+        <p:txBody>
+          <a:bodyPr wrap="square" rtlCol="0">
+            <a:spAutoFit/>
+          </a:bodyPr>
+          <a:lstStyle/>
+          <a:p>
+            <a:r>
+              <a:rPr lang="en-US" dirty="0" smtClean="0"/>
+              <a:t>Medium Grid view</a:t>
+            </a:r>
+            <a:endParaRPr lang="en-US" dirty="0"/>
+          </a:p>
+        </p:txBody>
+      </p:sp>
+      <p:sp>
+        <p:nvSpPr>
+          <p:cNvPr id="21" name="TextBox 20"/>
+          <p:cNvSpPr txBox="1"/>
+          <p:nvPr/>
+        </p:nvSpPr>
+        <p:spPr>
+          <a:xfrm>
+            <a:off x="4977787" y="286439"/>
+            <a:ext cx="1762699" cy="369332"/>
+          </a:xfrm>
+          <a:prstGeom prst="rect">
+            <a:avLst/>
+          </a:prstGeom>
+          <a:noFill/>
+        </p:spPr>
+        <p:txBody>
+          <a:bodyPr wrap="square" rtlCol="0">
+            <a:spAutoFit/>
+          </a:bodyPr>
+          <a:lstStyle/>
+          <a:p>
+            <a:r>
+              <a:rPr lang="en-US" dirty="0" smtClean="0"/>
+              <a:t>Min Grid view</a:t>
+            </a:r>
+            <a:endParaRPr lang="en-US" dirty="0"/>
+          </a:p>
+        </p:txBody>
+      </p:sp>
+      <p:sp>
+        <p:nvSpPr>
+          <p:cNvPr id="22" name="Rectangle 21"/>
+          <p:cNvSpPr/>
+          <p:nvPr/>
+        </p:nvSpPr>
+        <p:spPr>
+          <a:xfrm>
+            <a:off x="2857042" y="655771"/>
+            <a:ext cx="1518492" cy="798456"/>
+          </a:xfrm>
+          <a:prstGeom prst="rect">
+            <a:avLst/>
+          </a:prstGeom>
+        </p:spPr>
+        <p:style>
+          <a:lnRef idx="2">
+            <a:schemeClr val="accent1">
+              <a:shade val="50000"/>
+            </a:schemeClr>
+          </a:lnRef>
+          <a:fillRef idx="1">
+            <a:schemeClr val="accent1"/>
+          </a:fillRef>
+          <a:effectRef idx="0">
+            <a:schemeClr val="accent1"/>
+          </a:effectRef>
+          <a:fontRef idx="minor">
+            <a:schemeClr val="lt1"/>
+          </a:fontRef>
+        </p:style>
+        <p:txBody>
+          <a:bodyPr rtlCol="0" anchor="ctr"/>
+          <a:lstStyle/>
+          <a:p>
+            <a:pPr algn="ctr"/>
+            <a:r>
+              <a:rPr lang="en-US" dirty="0" smtClean="0"/>
+              <a:t>Standard page header</a:t>
+            </a:r>
+            <a:endParaRPr lang="en-US" dirty="0"/>
+          </a:p>
+        </p:txBody>
+      </p:sp>
+      <p:sp>
+        <p:nvSpPr>
+          <p:cNvPr id="23" name="Rectangle 22"/>
+          <p:cNvSpPr/>
+          <p:nvPr/>
+        </p:nvSpPr>
+        <p:spPr>
+          <a:xfrm>
+            <a:off x="2844187" y="3901035"/>
+            <a:ext cx="1527674" cy="798456"/>
+          </a:xfrm>
+          <a:prstGeom prst="rect">
+            <a:avLst/>
+          </a:prstGeom>
+        </p:spPr>
+        <p:style>
+          <a:lnRef idx="2">
+            <a:schemeClr val="accent1">
+              <a:shade val="50000"/>
+            </a:schemeClr>
+          </a:lnRef>
+          <a:fillRef idx="1">
+            <a:schemeClr val="accent1"/>
+          </a:fillRef>
+          <a:effectRef idx="0">
+            <a:schemeClr val="accent1"/>
+          </a:effectRef>
+          <a:fontRef idx="minor">
+            <a:schemeClr val="lt1"/>
+          </a:fontRef>
+        </p:style>
+        <p:txBody>
+          <a:bodyPr rtlCol="0" anchor="ctr"/>
+          <a:lstStyle/>
+          <a:p>
+            <a:pPr algn="ctr"/>
+            <a:r>
+              <a:rPr lang="en-US" dirty="0" smtClean="0"/>
+              <a:t>Standard page </a:t>
+            </a:r>
+            <a:r>
+              <a:rPr lang="en-US" dirty="0" smtClean="0"/>
+              <a:t>footer</a:t>
+            </a:r>
+            <a:endParaRPr lang="en-US" dirty="0"/>
+          </a:p>
+        </p:txBody>
+      </p:sp>
+      <p:sp>
+        <p:nvSpPr>
+          <p:cNvPr id="24" name="Rectangle 23"/>
+          <p:cNvSpPr/>
+          <p:nvPr/>
+        </p:nvSpPr>
+        <p:spPr>
+          <a:xfrm>
+            <a:off x="2857042" y="1564396"/>
+            <a:ext cx="1518492" cy="2345946"/>
+          </a:xfrm>
+          <a:prstGeom prst="rect">
+            <a:avLst/>
+          </a:prstGeom>
+        </p:spPr>
+        <p:style>
+          <a:lnRef idx="2">
+            <a:schemeClr val="accent1">
+              <a:shade val="50000"/>
+            </a:schemeClr>
+          </a:lnRef>
+          <a:fillRef idx="1">
+            <a:schemeClr val="accent1"/>
+          </a:fillRef>
+          <a:effectRef idx="0">
+            <a:schemeClr val="accent1"/>
+          </a:effectRef>
+          <a:fontRef idx="minor">
+            <a:schemeClr val="lt1"/>
+          </a:fontRef>
+        </p:style>
+        <p:txBody>
+          <a:bodyPr rtlCol="0" anchor="ctr"/>
+          <a:lstStyle/>
+          <a:p>
+            <a:pPr algn="ctr"/>
+            <a:endParaRPr lang="en-US"/>
+          </a:p>
+        </p:txBody>
+      </p:sp>
+      <p:sp>
+        <p:nvSpPr>
+          <p:cNvPr id="25" name="Rectangle 24"/>
+          <p:cNvSpPr/>
+          <p:nvPr/>
+        </p:nvSpPr>
+        <p:spPr>
+          <a:xfrm>
+            <a:off x="2941506" y="1969393"/>
+            <a:ext cx="638978" cy="407624"/>
+          </a:xfrm>
+          <a:prstGeom prst="rect">
+            <a:avLst/>
+          </a:prstGeom>
+          <a:solidFill>
+            <a:schemeClr val="accent2"/>
+          </a:solidFill>
+        </p:spPr>
+        <p:style>
+          <a:lnRef idx="2">
+            <a:schemeClr val="accent1">
+              <a:shade val="50000"/>
+            </a:schemeClr>
+          </a:lnRef>
+          <a:fillRef idx="1">
+            <a:schemeClr val="accent1"/>
+          </a:fillRef>
+          <a:effectRef idx="0">
+            <a:schemeClr val="accent1"/>
+          </a:effectRef>
+          <a:fontRef idx="minor">
+            <a:schemeClr val="lt1"/>
+          </a:fontRef>
+        </p:style>
+        <p:txBody>
+          <a:bodyPr rtlCol="0" anchor="ctr"/>
+          <a:lstStyle/>
+          <a:p>
+            <a:pPr algn="ctr"/>
+            <a:r>
+              <a:rPr lang="en-US" dirty="0" smtClean="0"/>
+              <a:t>CI</a:t>
+            </a:r>
+            <a:endParaRPr lang="en-US" dirty="0"/>
+          </a:p>
+        </p:txBody>
+      </p:sp>
+      <p:sp>
+        <p:nvSpPr>
+          <p:cNvPr id="26" name="Rectangle 25"/>
+          <p:cNvSpPr/>
+          <p:nvPr/>
+        </p:nvSpPr>
+        <p:spPr>
+          <a:xfrm>
+            <a:off x="3620879" y="1969393"/>
+            <a:ext cx="638978" cy="407624"/>
+          </a:xfrm>
+          <a:prstGeom prst="rect">
+            <a:avLst/>
+          </a:prstGeom>
+          <a:solidFill>
+            <a:schemeClr val="accent2"/>
+          </a:solidFill>
+        </p:spPr>
+        <p:style>
+          <a:lnRef idx="2">
+            <a:schemeClr val="accent1">
+              <a:shade val="50000"/>
+            </a:schemeClr>
+          </a:lnRef>
+          <a:fillRef idx="1">
+            <a:schemeClr val="accent1"/>
+          </a:fillRef>
+          <a:effectRef idx="0">
+            <a:schemeClr val="accent1"/>
+          </a:effectRef>
+          <a:fontRef idx="minor">
+            <a:schemeClr val="lt1"/>
+          </a:fontRef>
+        </p:style>
+        <p:txBody>
+          <a:bodyPr rtlCol="0" anchor="ctr"/>
+          <a:lstStyle/>
+          <a:p>
+            <a:pPr algn="ctr"/>
+            <a:r>
+              <a:rPr lang="en-US" dirty="0" smtClean="0"/>
+              <a:t>CI</a:t>
+            </a:r>
+            <a:endParaRPr lang="en-US" dirty="0"/>
+          </a:p>
+        </p:txBody>
+      </p:sp>
+      <p:sp>
+        <p:nvSpPr>
+          <p:cNvPr id="27" name="Rectangle 26"/>
+          <p:cNvSpPr/>
+          <p:nvPr/>
+        </p:nvSpPr>
+        <p:spPr>
+          <a:xfrm>
+            <a:off x="2941505" y="3334442"/>
+            <a:ext cx="1318351" cy="407624"/>
+          </a:xfrm>
+          <a:prstGeom prst="rect">
+            <a:avLst/>
+          </a:prstGeom>
+          <a:solidFill>
+            <a:schemeClr val="accent2"/>
+          </a:solidFill>
+        </p:spPr>
+        <p:style>
+          <a:lnRef idx="2">
+            <a:schemeClr val="accent1">
+              <a:shade val="50000"/>
+            </a:schemeClr>
+          </a:lnRef>
+          <a:fillRef idx="1">
+            <a:schemeClr val="accent1"/>
+          </a:fillRef>
+          <a:effectRef idx="0">
+            <a:schemeClr val="accent1"/>
+          </a:effectRef>
+          <a:fontRef idx="minor">
+            <a:schemeClr val="lt1"/>
+          </a:fontRef>
+        </p:style>
+        <p:txBody>
+          <a:bodyPr rtlCol="0" anchor="ctr"/>
+          <a:lstStyle/>
+          <a:p>
+            <a:pPr algn="ctr"/>
+            <a:r>
+              <a:rPr lang="en-US" dirty="0" smtClean="0"/>
+              <a:t>CI</a:t>
+            </a:r>
+            <a:endParaRPr lang="en-US" dirty="0"/>
+          </a:p>
+        </p:txBody>
+      </p:sp>
+      <p:sp>
+        <p:nvSpPr>
+          <p:cNvPr id="31" name="Rectangle 30"/>
+          <p:cNvSpPr/>
+          <p:nvPr/>
+        </p:nvSpPr>
+        <p:spPr>
+          <a:xfrm>
+            <a:off x="2941506" y="2870154"/>
+            <a:ext cx="638978" cy="407624"/>
+          </a:xfrm>
+          <a:prstGeom prst="rect">
+            <a:avLst/>
+          </a:prstGeom>
+          <a:solidFill>
+            <a:schemeClr val="accent2"/>
+          </a:solidFill>
+        </p:spPr>
+        <p:style>
+          <a:lnRef idx="2">
+            <a:schemeClr val="accent1">
+              <a:shade val="50000"/>
+            </a:schemeClr>
+          </a:lnRef>
+          <a:fillRef idx="1">
+            <a:schemeClr val="accent1"/>
+          </a:fillRef>
+          <a:effectRef idx="0">
+            <a:schemeClr val="accent1"/>
+          </a:effectRef>
+          <a:fontRef idx="minor">
+            <a:schemeClr val="lt1"/>
+          </a:fontRef>
+        </p:style>
+        <p:txBody>
+          <a:bodyPr rtlCol="0" anchor="ctr"/>
+          <a:lstStyle/>
+          <a:p>
+            <a:pPr algn="ctr"/>
+            <a:r>
+              <a:rPr lang="en-US" dirty="0" smtClean="0"/>
+              <a:t>CI</a:t>
+            </a:r>
+            <a:endParaRPr lang="en-US" dirty="0"/>
+          </a:p>
+        </p:txBody>
+      </p:sp>
+      <p:sp>
+        <p:nvSpPr>
+          <p:cNvPr id="32" name="Rectangle 31"/>
+          <p:cNvSpPr/>
+          <p:nvPr/>
+        </p:nvSpPr>
+        <p:spPr>
+          <a:xfrm>
+            <a:off x="3620879" y="2411652"/>
+            <a:ext cx="638978" cy="866126"/>
+          </a:xfrm>
+          <a:prstGeom prst="rect">
+            <a:avLst/>
+          </a:prstGeom>
+          <a:solidFill>
+            <a:schemeClr val="accent2"/>
+          </a:solidFill>
+        </p:spPr>
+        <p:style>
+          <a:lnRef idx="2">
+            <a:schemeClr val="accent1">
+              <a:shade val="50000"/>
+            </a:schemeClr>
+          </a:lnRef>
+          <a:fillRef idx="1">
+            <a:schemeClr val="accent1"/>
+          </a:fillRef>
+          <a:effectRef idx="0">
+            <a:schemeClr val="accent1"/>
+          </a:effectRef>
+          <a:fontRef idx="minor">
+            <a:schemeClr val="lt1"/>
+          </a:fontRef>
+        </p:style>
+        <p:txBody>
+          <a:bodyPr rtlCol="0" anchor="ctr"/>
+          <a:lstStyle/>
+          <a:p>
+            <a:pPr algn="ctr"/>
+            <a:r>
+              <a:rPr lang="en-US" dirty="0" smtClean="0"/>
+              <a:t>CI</a:t>
+            </a:r>
+            <a:endParaRPr lang="en-US" dirty="0"/>
+          </a:p>
+        </p:txBody>
+      </p:sp>
+      <p:sp>
+        <p:nvSpPr>
+          <p:cNvPr id="34" name="TextBox 33"/>
+          <p:cNvSpPr txBox="1"/>
+          <p:nvPr/>
+        </p:nvSpPr>
+        <p:spPr>
+          <a:xfrm>
+            <a:off x="3022296" y="1652530"/>
+            <a:ext cx="1138410" cy="369332"/>
+          </a:xfrm>
+          <a:prstGeom prst="rect">
+            <a:avLst/>
+          </a:prstGeom>
+          <a:noFill/>
+        </p:spPr>
+        <p:txBody>
+          <a:bodyPr wrap="square" rtlCol="0">
+            <a:spAutoFit/>
+          </a:bodyPr>
+          <a:lstStyle/>
+          <a:p>
+            <a:pPr algn="ctr"/>
+            <a:r>
+              <a:rPr lang="en-US" dirty="0" smtClean="0"/>
+              <a:t>Header</a:t>
+            </a:r>
+            <a:endParaRPr lang="en-US" dirty="0"/>
+          </a:p>
+        </p:txBody>
+      </p:sp>
+      <p:sp>
+        <p:nvSpPr>
+          <p:cNvPr id="35" name="Action Button: Custom 34">
+            <a:hlinkClick r:id="" action="ppaction://noaction" highlightClick="1"/>
+          </p:cNvPr>
+          <p:cNvSpPr/>
+          <p:nvPr/>
+        </p:nvSpPr>
+        <p:spPr>
+          <a:xfrm>
+            <a:off x="2854352" y="1382115"/>
+            <a:ext cx="1521182" cy="269646"/>
+          </a:xfrm>
+          <a:prstGeom prst="actionButtonBlank">
+            <a:avLst/>
+          </a:prstGeom>
+          <a:ln>
+            <a:solidFill>
+              <a:schemeClr val="tx1">
+                <a:lumMod val="75000"/>
+                <a:lumOff val="25000"/>
+              </a:schemeClr>
+            </a:solidFill>
+          </a:ln>
+        </p:spPr>
+        <p:style>
+          <a:lnRef idx="2">
+            <a:schemeClr val="accent1">
+              <a:shade val="50000"/>
+            </a:schemeClr>
+          </a:lnRef>
+          <a:fillRef idx="1">
+            <a:schemeClr val="accent1"/>
+          </a:fillRef>
+          <a:effectRef idx="0">
+            <a:schemeClr val="accent1"/>
+          </a:effectRef>
+          <a:fontRef idx="minor">
+            <a:schemeClr val="lt1"/>
+          </a:fontRef>
+        </p:style>
+        <p:txBody>
+          <a:bodyPr rtlCol="0" anchor="ctr"/>
+          <a:lstStyle/>
+          <a:p>
+            <a:pPr algn="ctr"/>
+            <a:r>
+              <a:rPr lang="en-US" dirty="0" err="1" smtClean="0"/>
+              <a:t>Nav</a:t>
+            </a:r>
+            <a:r>
+              <a:rPr lang="en-US" dirty="0" smtClean="0"/>
+              <a:t> Button</a:t>
+            </a:r>
+            <a:endParaRPr lang="en-US" dirty="0"/>
+          </a:p>
+        </p:txBody>
+      </p:sp>
+      <p:sp>
+        <p:nvSpPr>
+          <p:cNvPr id="37" name="Rectangle 36"/>
+          <p:cNvSpPr/>
+          <p:nvPr/>
+        </p:nvSpPr>
+        <p:spPr>
+          <a:xfrm>
+            <a:off x="5335839" y="655771"/>
+            <a:ext cx="881342" cy="798456"/>
+          </a:xfrm>
+          <a:prstGeom prst="rect">
+            <a:avLst/>
+          </a:prstGeom>
+        </p:spPr>
+        <p:style>
+          <a:lnRef idx="2">
+            <a:schemeClr val="accent1">
+              <a:shade val="50000"/>
+            </a:schemeClr>
+          </a:lnRef>
+          <a:fillRef idx="1">
+            <a:schemeClr val="accent1"/>
+          </a:fillRef>
+          <a:effectRef idx="0">
+            <a:schemeClr val="accent1"/>
+          </a:effectRef>
+          <a:fontRef idx="minor">
+            <a:schemeClr val="lt1"/>
+          </a:fontRef>
+        </p:style>
+        <p:txBody>
+          <a:bodyPr rtlCol="0" anchor="ctr"/>
+          <a:lstStyle/>
+          <a:p>
+            <a:pPr algn="ctr"/>
+            <a:r>
+              <a:rPr lang="en-US" sz="1400" dirty="0" smtClean="0"/>
+              <a:t>Standard page header</a:t>
+            </a:r>
+            <a:endParaRPr lang="en-US" sz="1400" dirty="0"/>
+          </a:p>
+        </p:txBody>
+      </p:sp>
+      <p:sp>
+        <p:nvSpPr>
+          <p:cNvPr id="38" name="Rectangle 37"/>
+          <p:cNvSpPr/>
+          <p:nvPr/>
+        </p:nvSpPr>
+        <p:spPr>
+          <a:xfrm>
+            <a:off x="5335839" y="3800316"/>
+            <a:ext cx="890524" cy="796354"/>
+          </a:xfrm>
+          <a:prstGeom prst="rect">
+            <a:avLst/>
+          </a:prstGeom>
+        </p:spPr>
+        <p:style>
+          <a:lnRef idx="2">
+            <a:schemeClr val="accent1">
+              <a:shade val="50000"/>
+            </a:schemeClr>
+          </a:lnRef>
+          <a:fillRef idx="1">
+            <a:schemeClr val="accent1"/>
+          </a:fillRef>
+          <a:effectRef idx="0">
+            <a:schemeClr val="accent1"/>
+          </a:effectRef>
+          <a:fontRef idx="minor">
+            <a:schemeClr val="lt1"/>
+          </a:fontRef>
+        </p:style>
+        <p:txBody>
+          <a:bodyPr rtlCol="0" anchor="ctr"/>
+          <a:lstStyle/>
+          <a:p>
+            <a:pPr algn="ctr"/>
+            <a:r>
+              <a:rPr lang="en-US" sz="1400" dirty="0" smtClean="0"/>
+              <a:t>Standard page footer</a:t>
+            </a:r>
+            <a:endParaRPr lang="en-US" sz="1400" dirty="0"/>
+          </a:p>
+        </p:txBody>
+      </p:sp>
+      <p:sp>
+        <p:nvSpPr>
+          <p:cNvPr id="39" name="Rectangle 38"/>
+          <p:cNvSpPr/>
+          <p:nvPr/>
+        </p:nvSpPr>
+        <p:spPr>
+          <a:xfrm>
+            <a:off x="5335839" y="1564396"/>
+            <a:ext cx="881342" cy="2245870"/>
+          </a:xfrm>
+          <a:prstGeom prst="rect">
+            <a:avLst/>
+          </a:prstGeom>
+        </p:spPr>
+        <p:style>
+          <a:lnRef idx="2">
+            <a:schemeClr val="accent1">
+              <a:shade val="50000"/>
+            </a:schemeClr>
+          </a:lnRef>
+          <a:fillRef idx="1">
+            <a:schemeClr val="accent1"/>
+          </a:fillRef>
+          <a:effectRef idx="0">
+            <a:schemeClr val="accent1"/>
+          </a:effectRef>
+          <a:fontRef idx="minor">
+            <a:schemeClr val="lt1"/>
+          </a:fontRef>
+        </p:style>
+        <p:txBody>
+          <a:bodyPr rtlCol="0" anchor="ctr"/>
+          <a:lstStyle/>
+          <a:p>
+            <a:pPr algn="ctr"/>
+            <a:endParaRPr lang="en-US"/>
+          </a:p>
+        </p:txBody>
+      </p:sp>
+      <p:sp>
+        <p:nvSpPr>
+          <p:cNvPr id="40" name="Rectangle 39"/>
+          <p:cNvSpPr/>
+          <p:nvPr/>
+        </p:nvSpPr>
+        <p:spPr>
+          <a:xfrm>
+            <a:off x="5447843" y="1914140"/>
+            <a:ext cx="638978" cy="407624"/>
+          </a:xfrm>
+          <a:prstGeom prst="rect">
+            <a:avLst/>
+          </a:prstGeom>
+          <a:solidFill>
+            <a:schemeClr val="accent2"/>
+          </a:solidFill>
+        </p:spPr>
+        <p:style>
+          <a:lnRef idx="2">
+            <a:schemeClr val="accent1">
+              <a:shade val="50000"/>
+            </a:schemeClr>
+          </a:lnRef>
+          <a:fillRef idx="1">
+            <a:schemeClr val="accent1"/>
+          </a:fillRef>
+          <a:effectRef idx="0">
+            <a:schemeClr val="accent1"/>
+          </a:effectRef>
+          <a:fontRef idx="minor">
+            <a:schemeClr val="lt1"/>
+          </a:fontRef>
+        </p:style>
+        <p:txBody>
+          <a:bodyPr rtlCol="0" anchor="ctr"/>
+          <a:lstStyle/>
+          <a:p>
+            <a:pPr algn="ctr"/>
+            <a:r>
+              <a:rPr lang="en-US" dirty="0" smtClean="0"/>
+              <a:t>CI</a:t>
+            </a:r>
+            <a:endParaRPr lang="en-US" dirty="0"/>
+          </a:p>
+        </p:txBody>
+      </p:sp>
+      <p:sp>
+        <p:nvSpPr>
+          <p:cNvPr id="42" name="Rectangle 41"/>
+          <p:cNvSpPr/>
+          <p:nvPr/>
+        </p:nvSpPr>
+        <p:spPr>
+          <a:xfrm>
+            <a:off x="5471716" y="3304053"/>
+            <a:ext cx="638978" cy="407624"/>
+          </a:xfrm>
+          <a:prstGeom prst="rect">
+            <a:avLst/>
+          </a:prstGeom>
+          <a:solidFill>
+            <a:schemeClr val="accent2"/>
+          </a:solidFill>
+        </p:spPr>
+        <p:style>
+          <a:lnRef idx="2">
+            <a:schemeClr val="accent1">
+              <a:shade val="50000"/>
+            </a:schemeClr>
+          </a:lnRef>
+          <a:fillRef idx="1">
+            <a:schemeClr val="accent1"/>
+          </a:fillRef>
+          <a:effectRef idx="0">
+            <a:schemeClr val="accent1"/>
+          </a:effectRef>
+          <a:fontRef idx="minor">
+            <a:schemeClr val="lt1"/>
+          </a:fontRef>
+        </p:style>
+        <p:txBody>
+          <a:bodyPr rtlCol="0" anchor="ctr"/>
+          <a:lstStyle/>
+          <a:p>
+            <a:pPr algn="ctr"/>
+            <a:r>
+              <a:rPr lang="en-US" dirty="0" smtClean="0"/>
+              <a:t>CI</a:t>
+            </a:r>
+            <a:endParaRPr lang="en-US" dirty="0"/>
+          </a:p>
+        </p:txBody>
+      </p:sp>
+      <p:sp>
+        <p:nvSpPr>
+          <p:cNvPr id="46" name="Rectangle 45"/>
+          <p:cNvSpPr/>
+          <p:nvPr/>
+        </p:nvSpPr>
+        <p:spPr>
+          <a:xfrm>
+            <a:off x="5447843" y="2370175"/>
+            <a:ext cx="638978" cy="624362"/>
+          </a:xfrm>
+          <a:prstGeom prst="rect">
+            <a:avLst/>
+          </a:prstGeom>
+          <a:solidFill>
+            <a:schemeClr val="accent2"/>
+          </a:solidFill>
+        </p:spPr>
+        <p:style>
+          <a:lnRef idx="2">
+            <a:schemeClr val="accent1">
+              <a:shade val="50000"/>
+            </a:schemeClr>
+          </a:lnRef>
+          <a:fillRef idx="1">
+            <a:schemeClr val="accent1"/>
+          </a:fillRef>
+          <a:effectRef idx="0">
+            <a:schemeClr val="accent1"/>
+          </a:effectRef>
+          <a:fontRef idx="minor">
+            <a:schemeClr val="lt1"/>
+          </a:fontRef>
+        </p:style>
+        <p:txBody>
+          <a:bodyPr rtlCol="0" anchor="ctr"/>
+          <a:lstStyle/>
+          <a:p>
+            <a:pPr algn="ctr"/>
+            <a:r>
+              <a:rPr lang="en-US" dirty="0" smtClean="0"/>
+              <a:t>CI</a:t>
+            </a:r>
+            <a:endParaRPr lang="en-US" dirty="0"/>
+          </a:p>
+        </p:txBody>
+      </p:sp>
+      <p:sp>
+        <p:nvSpPr>
+          <p:cNvPr id="49" name="TextBox 48"/>
+          <p:cNvSpPr txBox="1"/>
+          <p:nvPr/>
+        </p:nvSpPr>
+        <p:spPr>
+          <a:xfrm>
+            <a:off x="5423970" y="1652530"/>
+            <a:ext cx="662851" cy="261610"/>
+          </a:xfrm>
+          <a:prstGeom prst="rect">
+            <a:avLst/>
+          </a:prstGeom>
+          <a:noFill/>
+        </p:spPr>
+        <p:txBody>
+          <a:bodyPr wrap="square" rtlCol="0">
+            <a:spAutoFit/>
+          </a:bodyPr>
+          <a:lstStyle/>
+          <a:p>
+            <a:pPr algn="ctr"/>
+            <a:r>
+              <a:rPr lang="en-US" sz="1100" dirty="0" smtClean="0"/>
+              <a:t>Header</a:t>
+            </a:r>
+            <a:endParaRPr lang="en-US" sz="1100" dirty="0"/>
+          </a:p>
+        </p:txBody>
+      </p:sp>
+      <p:sp>
+        <p:nvSpPr>
+          <p:cNvPr id="50" name="Action Button: Custom 49">
+            <a:hlinkClick r:id="" action="ppaction://noaction" highlightClick="1"/>
+          </p:cNvPr>
+          <p:cNvSpPr/>
+          <p:nvPr/>
+        </p:nvSpPr>
+        <p:spPr>
+          <a:xfrm>
+            <a:off x="5326657" y="1381790"/>
+            <a:ext cx="890524" cy="269646"/>
+          </a:xfrm>
+          <a:prstGeom prst="actionButtonBlank">
+            <a:avLst/>
+          </a:prstGeom>
+          <a:ln>
+            <a:solidFill>
+              <a:schemeClr val="tx1">
+                <a:lumMod val="75000"/>
+                <a:lumOff val="25000"/>
+              </a:schemeClr>
+            </a:solidFill>
+          </a:ln>
+        </p:spPr>
+        <p:style>
+          <a:lnRef idx="2">
+            <a:schemeClr val="accent1">
+              <a:shade val="50000"/>
+            </a:schemeClr>
+          </a:lnRef>
+          <a:fillRef idx="1">
+            <a:schemeClr val="accent1"/>
+          </a:fillRef>
+          <a:effectRef idx="0">
+            <a:schemeClr val="accent1"/>
+          </a:effectRef>
+          <a:fontRef idx="minor">
+            <a:schemeClr val="lt1"/>
+          </a:fontRef>
+        </p:style>
+        <p:txBody>
+          <a:bodyPr rtlCol="0" anchor="ctr"/>
+          <a:lstStyle/>
+          <a:p>
+            <a:pPr algn="ctr"/>
+            <a:r>
+              <a:rPr lang="en-US" dirty="0" err="1" smtClean="0"/>
+              <a:t>Nav</a:t>
+            </a:r>
+            <a:r>
+              <a:rPr lang="en-US" dirty="0" smtClean="0"/>
+              <a:t> B</a:t>
+            </a:r>
+            <a:endParaRPr lang="en-US" dirty="0"/>
+          </a:p>
+        </p:txBody>
+      </p:sp>
+      <p:sp>
+        <p:nvSpPr>
+          <p:cNvPr id="77" name="TextBox 76"/>
+          <p:cNvSpPr txBox="1"/>
+          <p:nvPr/>
+        </p:nvSpPr>
+        <p:spPr>
+          <a:xfrm>
+            <a:off x="6740486" y="309486"/>
+            <a:ext cx="4979623" cy="5355312"/>
+          </a:xfrm>
+          <a:prstGeom prst="rect">
+            <a:avLst/>
+          </a:prstGeom>
+          <a:noFill/>
+        </p:spPr>
+        <p:txBody>
+          <a:bodyPr wrap="square" rtlCol="0">
+            <a:spAutoFit/>
+          </a:bodyPr>
+          <a:lstStyle/>
+          <a:p>
+            <a:r>
+              <a:rPr lang="en-US" b="1" u="sng" dirty="0" smtClean="0"/>
+              <a:t>Header: </a:t>
+            </a:r>
+          </a:p>
+          <a:p>
+            <a:pPr marL="285750" indent="-285750">
+              <a:buFont typeface="Arial" panose="020B0604020202020204" pitchFamily="34" charset="0"/>
+              <a:buChar char="•"/>
+            </a:pPr>
+            <a:r>
+              <a:rPr lang="en-US" dirty="0" smtClean="0"/>
+              <a:t>Max </a:t>
+            </a:r>
+            <a:r>
+              <a:rPr lang="en-US" dirty="0"/>
+              <a:t>and Medium </a:t>
+            </a:r>
+            <a:r>
+              <a:rPr lang="en-US" dirty="0" smtClean="0"/>
+              <a:t>views will </a:t>
+            </a:r>
+            <a:r>
+              <a:rPr lang="en-US" dirty="0" smtClean="0"/>
+              <a:t>contain the company logo and Name</a:t>
+            </a:r>
+            <a:endParaRPr lang="en-US" dirty="0" smtClean="0"/>
+          </a:p>
+          <a:p>
+            <a:pPr marL="285750" indent="-285750">
+              <a:buFont typeface="Arial" panose="020B0604020202020204" pitchFamily="34" charset="0"/>
+              <a:buChar char="•"/>
+            </a:pPr>
+            <a:r>
+              <a:rPr lang="en-US" dirty="0"/>
+              <a:t>Medium </a:t>
+            </a:r>
+            <a:r>
+              <a:rPr lang="en-US" dirty="0" smtClean="0"/>
+              <a:t>and Min views will not have a </a:t>
+            </a:r>
+            <a:r>
+              <a:rPr lang="en-US" dirty="0" err="1" smtClean="0"/>
+              <a:t>nav</a:t>
+            </a:r>
+            <a:r>
+              <a:rPr lang="en-US" dirty="0" smtClean="0"/>
+              <a:t> bar but a hamburger button with a drop down</a:t>
+            </a:r>
+          </a:p>
+          <a:p>
+            <a:pPr marL="285750" indent="-285750">
+              <a:buFont typeface="Arial" panose="020B0604020202020204" pitchFamily="34" charset="0"/>
+              <a:buChar char="•"/>
+            </a:pPr>
+            <a:r>
+              <a:rPr lang="en-US" dirty="0" smtClean="0"/>
+              <a:t>Each header will have social media icons</a:t>
+            </a:r>
+          </a:p>
+          <a:p>
+            <a:r>
+              <a:rPr lang="en-US" b="1" u="sng" dirty="0" smtClean="0"/>
+              <a:t>Main / Body</a:t>
+            </a:r>
+          </a:p>
+          <a:p>
+            <a:pPr marL="285750" indent="-285750">
+              <a:buFont typeface="Arial" panose="020B0604020202020204" pitchFamily="34" charset="0"/>
+              <a:buChar char="•"/>
+            </a:pPr>
+            <a:r>
+              <a:rPr lang="en-US" dirty="0" smtClean="0"/>
+              <a:t>Headers and sub headers will be through out the body</a:t>
+            </a:r>
+          </a:p>
+          <a:p>
+            <a:pPr marL="285750" indent="-285750">
+              <a:buFont typeface="Arial" panose="020B0604020202020204" pitchFamily="34" charset="0"/>
+              <a:buChar char="•"/>
+            </a:pPr>
+            <a:r>
+              <a:rPr lang="en-US" dirty="0" smtClean="0"/>
+              <a:t>CI are content information holders (Text, Images, buttons, etc.)</a:t>
+            </a:r>
+          </a:p>
+          <a:p>
+            <a:pPr marL="285750" indent="-285750">
+              <a:buFont typeface="Arial" panose="020B0604020202020204" pitchFamily="34" charset="0"/>
+              <a:buChar char="•"/>
+            </a:pPr>
+            <a:r>
+              <a:rPr lang="en-US" dirty="0" smtClean="0"/>
+              <a:t>Max view wil</a:t>
+            </a:r>
+            <a:r>
+              <a:rPr lang="en-US" dirty="0" smtClean="0"/>
+              <a:t>l have 3 columns</a:t>
+            </a:r>
+          </a:p>
+          <a:p>
+            <a:pPr marL="285750" indent="-285750">
+              <a:buFont typeface="Arial" panose="020B0604020202020204" pitchFamily="34" charset="0"/>
+              <a:buChar char="•"/>
+            </a:pPr>
+            <a:r>
+              <a:rPr lang="en-US" dirty="0" smtClean="0"/>
+              <a:t>Medium view 2 columns</a:t>
+            </a:r>
+          </a:p>
+          <a:p>
+            <a:pPr marL="285750" indent="-285750">
+              <a:buFont typeface="Arial" panose="020B0604020202020204" pitchFamily="34" charset="0"/>
+              <a:buChar char="•"/>
+            </a:pPr>
+            <a:r>
+              <a:rPr lang="en-US" dirty="0" smtClean="0"/>
+              <a:t>Min view 1 column</a:t>
+            </a:r>
+          </a:p>
+          <a:p>
+            <a:pPr marL="285750" indent="-285750">
+              <a:buFont typeface="Arial" panose="020B0604020202020204" pitchFamily="34" charset="0"/>
+              <a:buChar char="•"/>
+            </a:pPr>
+            <a:r>
+              <a:rPr lang="en-US" dirty="0" smtClean="0"/>
+              <a:t>There will be call to action buttons on the pages (see green box)</a:t>
+            </a:r>
+          </a:p>
+          <a:p>
+            <a:r>
+              <a:rPr lang="en-US" b="1" u="sng" dirty="0" smtClean="0"/>
+              <a:t>Footer</a:t>
+            </a:r>
+          </a:p>
+          <a:p>
+            <a:pPr marL="285750" indent="-285750">
+              <a:buFont typeface="Arial" panose="020B0604020202020204" pitchFamily="34" charset="0"/>
+              <a:buChar char="•"/>
+            </a:pPr>
+            <a:r>
+              <a:rPr lang="en-US" dirty="0" smtClean="0"/>
+              <a:t>Contact information</a:t>
+            </a:r>
+          </a:p>
+          <a:p>
+            <a:pPr marL="285750" indent="-285750">
+              <a:buFont typeface="Arial" panose="020B0604020202020204" pitchFamily="34" charset="0"/>
+              <a:buChar char="•"/>
+            </a:pPr>
+            <a:r>
+              <a:rPr lang="en-US" dirty="0" smtClean="0"/>
+              <a:t>Google maps location </a:t>
+            </a:r>
+            <a:endParaRPr lang="en-US" dirty="0"/>
+          </a:p>
+        </p:txBody>
+      </p:sp>
+      <p:sp>
+        <p:nvSpPr>
+          <p:cNvPr id="72" name="Rectangle 71"/>
+          <p:cNvSpPr/>
+          <p:nvPr/>
+        </p:nvSpPr>
+        <p:spPr>
+          <a:xfrm>
+            <a:off x="351624" y="1930833"/>
+            <a:ext cx="638978" cy="407624"/>
+          </a:xfrm>
+          <a:prstGeom prst="rect">
+            <a:avLst/>
+          </a:prstGeom>
+          <a:solidFill>
+            <a:schemeClr val="accent2"/>
+          </a:solidFill>
+        </p:spPr>
+        <p:style>
+          <a:lnRef idx="2">
+            <a:schemeClr val="accent1">
+              <a:shade val="50000"/>
+            </a:schemeClr>
+          </a:lnRef>
+          <a:fillRef idx="1">
+            <a:schemeClr val="accent1"/>
+          </a:fillRef>
+          <a:effectRef idx="0">
+            <a:schemeClr val="accent1"/>
+          </a:effectRef>
+          <a:fontRef idx="minor">
+            <a:schemeClr val="lt1"/>
+          </a:fontRef>
+        </p:style>
+        <p:txBody>
+          <a:bodyPr rtlCol="0" anchor="ctr"/>
+          <a:lstStyle/>
+          <a:p>
+            <a:pPr algn="ctr"/>
+            <a:r>
+              <a:rPr lang="en-US" dirty="0" smtClean="0"/>
+              <a:t>CI</a:t>
+            </a:r>
+            <a:endParaRPr lang="en-US" dirty="0"/>
+          </a:p>
+        </p:txBody>
+      </p:sp>
+      <p:sp>
+        <p:nvSpPr>
+          <p:cNvPr id="78" name="Rectangle 77"/>
+          <p:cNvSpPr/>
+          <p:nvPr/>
+        </p:nvSpPr>
+        <p:spPr>
+          <a:xfrm>
+            <a:off x="1030997" y="1930833"/>
+            <a:ext cx="638978" cy="407624"/>
+          </a:xfrm>
+          <a:prstGeom prst="rect">
+            <a:avLst/>
+          </a:prstGeom>
+          <a:solidFill>
+            <a:schemeClr val="accent2"/>
+          </a:solidFill>
+        </p:spPr>
+        <p:style>
+          <a:lnRef idx="2">
+            <a:schemeClr val="accent1">
+              <a:shade val="50000"/>
+            </a:schemeClr>
+          </a:lnRef>
+          <a:fillRef idx="1">
+            <a:schemeClr val="accent1"/>
+          </a:fillRef>
+          <a:effectRef idx="0">
+            <a:schemeClr val="accent1"/>
+          </a:effectRef>
+          <a:fontRef idx="minor">
+            <a:schemeClr val="lt1"/>
+          </a:fontRef>
+        </p:style>
+        <p:txBody>
+          <a:bodyPr rtlCol="0" anchor="ctr"/>
+          <a:lstStyle/>
+          <a:p>
+            <a:pPr algn="ctr"/>
+            <a:r>
+              <a:rPr lang="en-US" dirty="0" smtClean="0"/>
+              <a:t>CI</a:t>
+            </a:r>
+            <a:endParaRPr lang="en-US" dirty="0"/>
+          </a:p>
+        </p:txBody>
+      </p:sp>
+      <p:sp>
+        <p:nvSpPr>
+          <p:cNvPr id="79" name="Rectangle 78"/>
+          <p:cNvSpPr/>
+          <p:nvPr/>
+        </p:nvSpPr>
+        <p:spPr>
+          <a:xfrm>
+            <a:off x="1703026" y="1930833"/>
+            <a:ext cx="638978" cy="407624"/>
+          </a:xfrm>
+          <a:prstGeom prst="rect">
+            <a:avLst/>
+          </a:prstGeom>
+          <a:solidFill>
+            <a:schemeClr val="accent2"/>
+          </a:solidFill>
+        </p:spPr>
+        <p:style>
+          <a:lnRef idx="2">
+            <a:schemeClr val="accent1">
+              <a:shade val="50000"/>
+            </a:schemeClr>
+          </a:lnRef>
+          <a:fillRef idx="1">
+            <a:schemeClr val="accent1"/>
+          </a:fillRef>
+          <a:effectRef idx="0">
+            <a:schemeClr val="accent1"/>
+          </a:effectRef>
+          <a:fontRef idx="minor">
+            <a:schemeClr val="lt1"/>
+          </a:fontRef>
+        </p:style>
+        <p:txBody>
+          <a:bodyPr rtlCol="0" anchor="ctr"/>
+          <a:lstStyle/>
+          <a:p>
+            <a:pPr algn="ctr"/>
+            <a:r>
+              <a:rPr lang="en-US" dirty="0" smtClean="0"/>
+              <a:t>CI</a:t>
+            </a:r>
+            <a:endParaRPr lang="en-US" dirty="0"/>
+          </a:p>
+        </p:txBody>
+      </p:sp>
+      <p:sp>
+        <p:nvSpPr>
+          <p:cNvPr id="80" name="TextBox 79"/>
+          <p:cNvSpPr txBox="1"/>
+          <p:nvPr/>
+        </p:nvSpPr>
+        <p:spPr>
+          <a:xfrm>
+            <a:off x="496678" y="2298873"/>
+            <a:ext cx="1762699" cy="369332"/>
+          </a:xfrm>
+          <a:prstGeom prst="rect">
+            <a:avLst/>
+          </a:prstGeom>
+          <a:noFill/>
+        </p:spPr>
+        <p:txBody>
+          <a:bodyPr wrap="square" rtlCol="0">
+            <a:spAutoFit/>
+          </a:bodyPr>
+          <a:lstStyle/>
+          <a:p>
+            <a:pPr algn="ctr"/>
+            <a:r>
+              <a:rPr lang="en-US" dirty="0" smtClean="0"/>
+              <a:t>Sub Header</a:t>
+            </a:r>
+            <a:endParaRPr lang="en-US" dirty="0"/>
+          </a:p>
+        </p:txBody>
+      </p:sp>
+      <p:sp>
+        <p:nvSpPr>
+          <p:cNvPr id="81" name="TextBox 80"/>
+          <p:cNvSpPr txBox="1"/>
+          <p:nvPr/>
+        </p:nvSpPr>
+        <p:spPr>
+          <a:xfrm>
+            <a:off x="37640" y="3067725"/>
+            <a:ext cx="1749847" cy="369332"/>
+          </a:xfrm>
+          <a:prstGeom prst="rect">
+            <a:avLst/>
+          </a:prstGeom>
+          <a:noFill/>
+        </p:spPr>
+        <p:txBody>
+          <a:bodyPr wrap="square" rtlCol="0">
+            <a:spAutoFit/>
+          </a:bodyPr>
+          <a:lstStyle/>
+          <a:p>
+            <a:pPr algn="ctr"/>
+            <a:r>
+              <a:rPr lang="en-US" dirty="0" smtClean="0"/>
+              <a:t>Sub Header</a:t>
+            </a:r>
+            <a:endParaRPr lang="en-US" dirty="0"/>
+          </a:p>
+        </p:txBody>
+      </p:sp>
+      <p:sp>
+        <p:nvSpPr>
+          <p:cNvPr id="83" name="TextBox 82"/>
+          <p:cNvSpPr txBox="1"/>
+          <p:nvPr/>
+        </p:nvSpPr>
+        <p:spPr>
+          <a:xfrm>
+            <a:off x="2687198" y="2333039"/>
+            <a:ext cx="1138410" cy="646331"/>
+          </a:xfrm>
+          <a:prstGeom prst="rect">
+            <a:avLst/>
+          </a:prstGeom>
+          <a:noFill/>
+        </p:spPr>
+        <p:txBody>
+          <a:bodyPr wrap="square" rtlCol="0">
+            <a:spAutoFit/>
+          </a:bodyPr>
+          <a:lstStyle/>
+          <a:p>
+            <a:pPr algn="ctr"/>
+            <a:r>
+              <a:rPr lang="en-US" dirty="0" smtClean="0"/>
+              <a:t>Sub Header</a:t>
+            </a:r>
+            <a:endParaRPr lang="en-US" dirty="0"/>
+          </a:p>
+        </p:txBody>
+      </p:sp>
+      <p:sp>
+        <p:nvSpPr>
+          <p:cNvPr id="84" name="TextBox 83"/>
+          <p:cNvSpPr txBox="1"/>
+          <p:nvPr/>
+        </p:nvSpPr>
+        <p:spPr>
+          <a:xfrm>
+            <a:off x="5447843" y="2937595"/>
+            <a:ext cx="662851" cy="430887"/>
+          </a:xfrm>
+          <a:prstGeom prst="rect">
+            <a:avLst/>
+          </a:prstGeom>
+          <a:noFill/>
+        </p:spPr>
+        <p:txBody>
+          <a:bodyPr wrap="square" rtlCol="0">
+            <a:spAutoFit/>
+          </a:bodyPr>
+          <a:lstStyle/>
+          <a:p>
+            <a:pPr algn="ctr"/>
+            <a:r>
+              <a:rPr lang="en-US" sz="1100" dirty="0" smtClean="0"/>
+              <a:t>Sub Header</a:t>
+            </a:r>
+            <a:endParaRPr lang="en-US" sz="1100" dirty="0"/>
+          </a:p>
+        </p:txBody>
+      </p:sp>
+      <p:sp>
+        <p:nvSpPr>
+          <p:cNvPr id="2" name="Action Button: Home 1">
+            <a:hlinkClick r:id="" action="ppaction://hlinkshowjump?jump=firstslide" highlightClick="1"/>
+          </p:cNvPr>
+          <p:cNvSpPr/>
+          <p:nvPr/>
+        </p:nvSpPr>
+        <p:spPr>
+          <a:xfrm>
+            <a:off x="385595" y="1977577"/>
+            <a:ext cx="268994" cy="232823"/>
+          </a:xfrm>
+          <a:prstGeom prst="actionButtonHome">
+            <a:avLst/>
+          </a:prstGeom>
+        </p:spPr>
+        <p:style>
+          <a:lnRef idx="2">
+            <a:schemeClr val="accent6">
+              <a:shade val="50000"/>
+            </a:schemeClr>
+          </a:lnRef>
+          <a:fillRef idx="1">
+            <a:schemeClr val="accent6"/>
+          </a:fillRef>
+          <a:effectRef idx="0">
+            <a:schemeClr val="accent6"/>
+          </a:effectRef>
+          <a:fontRef idx="minor">
+            <a:schemeClr val="lt1"/>
+          </a:fontRef>
+        </p:style>
+        <p:txBody>
+          <a:bodyPr rtlCol="0" anchor="ctr"/>
+          <a:lstStyle/>
+          <a:p>
+            <a:pPr algn="ctr"/>
+            <a:endParaRPr lang="en-US"/>
+          </a:p>
+        </p:txBody>
+      </p:sp>
+      <p:sp>
+        <p:nvSpPr>
+          <p:cNvPr id="85" name="Action Button: Home 84">
+            <a:hlinkClick r:id="" action="ppaction://hlinkshowjump?jump=firstslide" highlightClick="1"/>
+          </p:cNvPr>
+          <p:cNvSpPr/>
+          <p:nvPr/>
+        </p:nvSpPr>
+        <p:spPr>
+          <a:xfrm>
+            <a:off x="3700293" y="2470423"/>
+            <a:ext cx="268994" cy="232823"/>
+          </a:xfrm>
+          <a:prstGeom prst="actionButtonHome">
+            <a:avLst/>
+          </a:prstGeom>
+        </p:spPr>
+        <p:style>
+          <a:lnRef idx="2">
+            <a:schemeClr val="accent6">
+              <a:shade val="50000"/>
+            </a:schemeClr>
+          </a:lnRef>
+          <a:fillRef idx="1">
+            <a:schemeClr val="accent6"/>
+          </a:fillRef>
+          <a:effectRef idx="0">
+            <a:schemeClr val="accent6"/>
+          </a:effectRef>
+          <a:fontRef idx="minor">
+            <a:schemeClr val="lt1"/>
+          </a:fontRef>
+        </p:style>
+        <p:txBody>
+          <a:bodyPr rtlCol="0" anchor="ctr"/>
+          <a:lstStyle/>
+          <a:p>
+            <a:pPr algn="ctr"/>
+            <a:endParaRPr lang="en-US"/>
+          </a:p>
+        </p:txBody>
+      </p:sp>
+      <p:sp>
+        <p:nvSpPr>
+          <p:cNvPr id="86" name="Action Button: Home 85">
+            <a:hlinkClick r:id="" action="ppaction://hlinkshowjump?jump=firstslide" highlightClick="1"/>
+          </p:cNvPr>
+          <p:cNvSpPr/>
+          <p:nvPr/>
+        </p:nvSpPr>
+        <p:spPr>
+          <a:xfrm>
+            <a:off x="5497425" y="2423381"/>
+            <a:ext cx="268994" cy="232823"/>
+          </a:xfrm>
+          <a:prstGeom prst="actionButtonHome">
+            <a:avLst/>
+          </a:prstGeom>
+        </p:spPr>
+        <p:style>
+          <a:lnRef idx="2">
+            <a:schemeClr val="accent6">
+              <a:shade val="50000"/>
+            </a:schemeClr>
+          </a:lnRef>
+          <a:fillRef idx="1">
+            <a:schemeClr val="accent6"/>
+          </a:fillRef>
+          <a:effectRef idx="0">
+            <a:schemeClr val="accent6"/>
+          </a:effectRef>
+          <a:fontRef idx="minor">
+            <a:schemeClr val="lt1"/>
+          </a:fontRef>
+        </p:style>
+        <p:txBody>
+          <a:bodyPr rtlCol="0" anchor="ctr"/>
+          <a:lstStyle/>
+          <a:p>
+            <a:pPr algn="ctr"/>
+            <a:endParaRPr lang="en-US"/>
+          </a:p>
+        </p:txBody>
+      </p:sp>
+      <p:sp>
+        <p:nvSpPr>
+          <p:cNvPr id="87" name="Action Button: Home 86">
+            <a:hlinkClick r:id="" action="ppaction://hlinkshowjump?jump=firstslide" highlightClick="1"/>
+          </p:cNvPr>
+          <p:cNvSpPr/>
+          <p:nvPr/>
+        </p:nvSpPr>
+        <p:spPr>
+          <a:xfrm>
+            <a:off x="1771422" y="2757979"/>
+            <a:ext cx="268994" cy="232823"/>
+          </a:xfrm>
+          <a:prstGeom prst="actionButtonHome">
+            <a:avLst/>
+          </a:prstGeom>
+        </p:spPr>
+        <p:style>
+          <a:lnRef idx="2">
+            <a:schemeClr val="accent6">
+              <a:shade val="50000"/>
+            </a:schemeClr>
+          </a:lnRef>
+          <a:fillRef idx="1">
+            <a:schemeClr val="accent6"/>
+          </a:fillRef>
+          <a:effectRef idx="0">
+            <a:schemeClr val="accent6"/>
+          </a:effectRef>
+          <a:fontRef idx="minor">
+            <a:schemeClr val="lt1"/>
+          </a:fontRef>
+        </p:style>
+        <p:txBody>
+          <a:bodyPr rtlCol="0" anchor="ctr"/>
+          <a:lstStyle/>
+          <a:p>
+            <a:pPr algn="ctr"/>
+            <a:endParaRPr lang="en-US"/>
+          </a:p>
+        </p:txBody>
+      </p:sp>
+    </p:spTree>
+    <p:extLst>
+      <p:ext uri="{BB962C8B-B14F-4D97-AF65-F5344CB8AC3E}">
+        <p14:creationId xmlns:p14="http://schemas.microsoft.com/office/powerpoint/2010/main" val="2775753125"/>
       </p:ext>
     </p:extLst>
   </p:cSld>

</xml_diff>